<commit_message>
updated slides n example
</commit_message>
<xml_diff>
--- a/Problem Formulation & EDA.pptx
+++ b/Problem Formulation & EDA.pptx
@@ -5,7 +5,7 @@
     <p:sldMasterId id="2147483648" r:id="rId1"/>
   </p:sldMasterIdLst>
   <p:notesMasterIdLst>
-    <p:notesMasterId r:id="rId17"/>
+    <p:notesMasterId r:id="rId14"/>
   </p:notesMasterIdLst>
   <p:sldIdLst>
     <p:sldId id="256" r:id="rId2"/>
@@ -17,12 +17,9 @@
     <p:sldId id="261" r:id="rId8"/>
     <p:sldId id="267" r:id="rId9"/>
     <p:sldId id="270" r:id="rId10"/>
-    <p:sldId id="266" r:id="rId11"/>
-    <p:sldId id="268" r:id="rId12"/>
-    <p:sldId id="269" r:id="rId13"/>
-    <p:sldId id="263" r:id="rId14"/>
-    <p:sldId id="262" r:id="rId15"/>
-    <p:sldId id="264" r:id="rId16"/>
+    <p:sldId id="263" r:id="rId11"/>
+    <p:sldId id="271" r:id="rId12"/>
+    <p:sldId id="264" r:id="rId13"/>
   </p:sldIdLst>
   <p:sldSz cx="12192000" cy="6858000"/>
   <p:notesSz cx="6858000" cy="9144000"/>
@@ -211,7 +208,7 @@
           <a:p>
             <a:fld id="{1107AAAD-A763-4B86-A2B7-07FBDE9BAB75}" type="datetimeFigureOut">
               <a:rPr lang="en-AU" smtClean="0"/>
-              <a:t>10/08/2021</a:t>
+              <a:t>11/08/2021</a:t>
             </a:fld>
             <a:endParaRPr lang="en-AU"/>
           </a:p>
@@ -1271,6 +1268,18 @@
               <a:t>For heavy excel users, think of it this way. Doing up a model without any EDA is like doing all the spreadsheet workings, then copy pasting as values and saving over it.</a:t>
             </a:r>
           </a:p>
+          <a:p>
+            <a:endParaRPr lang="en-AU" dirty="0"/>
+          </a:p>
+          <a:p>
+            <a:endParaRPr lang="en-AU" dirty="0"/>
+          </a:p>
+          <a:p>
+            <a:r>
+              <a:rPr lang="en-AU" dirty="0"/>
+              <a:t>The idea is go through and iterate through the EDA process, and throw the feature columns into one of these buckets along the way.</a:t>
+            </a:r>
+          </a:p>
         </p:txBody>
       </p:sp>
       <p:sp>
@@ -1783,7 +1792,7 @@
           <a:p>
             <a:fld id="{75394A9C-DD77-468F-899D-B535CEE43AF3}" type="slidenum">
               <a:rPr lang="en-AU" smtClean="0"/>
-              <a:t>13</a:t>
+              <a:t>10</a:t>
             </a:fld>
             <a:endParaRPr lang="en-AU"/>
           </a:p>
@@ -1951,7 +1960,7 @@
           <a:p>
             <a:fld id="{88AE2C35-0D28-4825-98D7-B391AF6BD3F5}" type="datetimeFigureOut">
               <a:rPr lang="en-AU" smtClean="0"/>
-              <a:t>10/08/2021</a:t>
+              <a:t>11/08/2021</a:t>
             </a:fld>
             <a:endParaRPr lang="en-AU"/>
           </a:p>
@@ -2151,7 +2160,7 @@
           <a:p>
             <a:fld id="{88AE2C35-0D28-4825-98D7-B391AF6BD3F5}" type="datetimeFigureOut">
               <a:rPr lang="en-AU" smtClean="0"/>
-              <a:t>10/08/2021</a:t>
+              <a:t>11/08/2021</a:t>
             </a:fld>
             <a:endParaRPr lang="en-AU"/>
           </a:p>
@@ -2361,7 +2370,7 @@
           <a:p>
             <a:fld id="{88AE2C35-0D28-4825-98D7-B391AF6BD3F5}" type="datetimeFigureOut">
               <a:rPr lang="en-AU" smtClean="0"/>
-              <a:t>10/08/2021</a:t>
+              <a:t>11/08/2021</a:t>
             </a:fld>
             <a:endParaRPr lang="en-AU"/>
           </a:p>
@@ -2561,7 +2570,7 @@
           <a:p>
             <a:fld id="{88AE2C35-0D28-4825-98D7-B391AF6BD3F5}" type="datetimeFigureOut">
               <a:rPr lang="en-AU" smtClean="0"/>
-              <a:t>10/08/2021</a:t>
+              <a:t>11/08/2021</a:t>
             </a:fld>
             <a:endParaRPr lang="en-AU"/>
           </a:p>
@@ -2837,7 +2846,7 @@
           <a:p>
             <a:fld id="{88AE2C35-0D28-4825-98D7-B391AF6BD3F5}" type="datetimeFigureOut">
               <a:rPr lang="en-AU" smtClean="0"/>
-              <a:t>10/08/2021</a:t>
+              <a:t>11/08/2021</a:t>
             </a:fld>
             <a:endParaRPr lang="en-AU"/>
           </a:p>
@@ -3105,7 +3114,7 @@
           <a:p>
             <a:fld id="{88AE2C35-0D28-4825-98D7-B391AF6BD3F5}" type="datetimeFigureOut">
               <a:rPr lang="en-AU" smtClean="0"/>
-              <a:t>10/08/2021</a:t>
+              <a:t>11/08/2021</a:t>
             </a:fld>
             <a:endParaRPr lang="en-AU"/>
           </a:p>
@@ -3520,7 +3529,7 @@
           <a:p>
             <a:fld id="{88AE2C35-0D28-4825-98D7-B391AF6BD3F5}" type="datetimeFigureOut">
               <a:rPr lang="en-AU" smtClean="0"/>
-              <a:t>10/08/2021</a:t>
+              <a:t>11/08/2021</a:t>
             </a:fld>
             <a:endParaRPr lang="en-AU"/>
           </a:p>
@@ -3662,7 +3671,7 @@
           <a:p>
             <a:fld id="{88AE2C35-0D28-4825-98D7-B391AF6BD3F5}" type="datetimeFigureOut">
               <a:rPr lang="en-AU" smtClean="0"/>
-              <a:t>10/08/2021</a:t>
+              <a:t>11/08/2021</a:t>
             </a:fld>
             <a:endParaRPr lang="en-AU"/>
           </a:p>
@@ -3775,7 +3784,7 @@
           <a:p>
             <a:fld id="{88AE2C35-0D28-4825-98D7-B391AF6BD3F5}" type="datetimeFigureOut">
               <a:rPr lang="en-AU" smtClean="0"/>
-              <a:t>10/08/2021</a:t>
+              <a:t>11/08/2021</a:t>
             </a:fld>
             <a:endParaRPr lang="en-AU"/>
           </a:p>
@@ -4088,7 +4097,7 @@
           <a:p>
             <a:fld id="{88AE2C35-0D28-4825-98D7-B391AF6BD3F5}" type="datetimeFigureOut">
               <a:rPr lang="en-AU" smtClean="0"/>
-              <a:t>10/08/2021</a:t>
+              <a:t>11/08/2021</a:t>
             </a:fld>
             <a:endParaRPr lang="en-AU"/>
           </a:p>
@@ -4377,7 +4386,7 @@
           <a:p>
             <a:fld id="{88AE2C35-0D28-4825-98D7-B391AF6BD3F5}" type="datetimeFigureOut">
               <a:rPr lang="en-AU" smtClean="0"/>
-              <a:t>10/08/2021</a:t>
+              <a:t>11/08/2021</a:t>
             </a:fld>
             <a:endParaRPr lang="en-AU"/>
           </a:p>
@@ -4620,7 +4629,7 @@
           <a:p>
             <a:fld id="{88AE2C35-0D28-4825-98D7-B391AF6BD3F5}" type="datetimeFigureOut">
               <a:rPr lang="en-AU" smtClean="0"/>
-              <a:t>10/08/2021</a:t>
+              <a:t>11/08/2021</a:t>
             </a:fld>
             <a:endParaRPr lang="en-AU"/>
           </a:p>
@@ -5125,7 +5134,7 @@
           <p:cNvPr id="2" name="Title 1">
             <a:extLst>
               <a:ext uri="{FF2B5EF4-FFF2-40B4-BE49-F238E27FC236}">
-                <a16:creationId xmlns:a16="http://schemas.microsoft.com/office/drawing/2014/main" id="{65465530-CAB9-4FD6-8525-0A767E11E104}"/>
+                <a16:creationId xmlns:a16="http://schemas.microsoft.com/office/drawing/2014/main" id="{D70239AA-CFA7-47C4-A1EA-57159D42A2B6}"/>
               </a:ext>
             </a:extLst>
           </p:cNvPr>
@@ -5143,7 +5152,7 @@
           <a:p>
             <a:r>
               <a:rPr lang="en-AU" dirty="0"/>
-              <a:t>Class Imbalance and suspicious results</a:t>
+              <a:t>Outliers and scaling</a:t>
             </a:r>
           </a:p>
         </p:txBody>
@@ -5153,7 +5162,7 @@
           <p:cNvPr id="3" name="Content Placeholder 2">
             <a:extLst>
               <a:ext uri="{FF2B5EF4-FFF2-40B4-BE49-F238E27FC236}">
-                <a16:creationId xmlns:a16="http://schemas.microsoft.com/office/drawing/2014/main" id="{416ACB70-FB68-415C-B2F4-B6E75AAA0FEB}"/>
+                <a16:creationId xmlns:a16="http://schemas.microsoft.com/office/drawing/2014/main" id="{03199408-7B90-4275-9417-824F79462D4B}"/>
               </a:ext>
             </a:extLst>
           </p:cNvPr>
@@ -5166,17 +5175,48 @@
         </p:nvSpPr>
         <p:spPr/>
         <p:txBody>
-          <a:bodyPr/>
-          <a:lstStyle/>
-          <a:p>
-            <a:endParaRPr lang="en-AU"/>
+          <a:bodyPr>
+            <a:normAutofit/>
+          </a:bodyPr>
+          <a:lstStyle/>
+          <a:p>
+            <a:pPr lvl="1"/>
+            <a:r>
+              <a:rPr lang="en-AU" dirty="0"/>
+              <a:t>Can be determined from either .describe() or scatter matrices</a:t>
+            </a:r>
+          </a:p>
+          <a:p>
+            <a:pPr lvl="1"/>
+            <a:r>
+              <a:rPr lang="en-AU" dirty="0"/>
+              <a:t>Do we need it?</a:t>
+            </a:r>
+          </a:p>
+          <a:p>
+            <a:pPr lvl="1"/>
+            <a:r>
+              <a:rPr lang="en-AU" dirty="0"/>
+              <a:t>Which algorithm should we use, and do we need to scale our data? (technically yes, it is always good practice)</a:t>
+            </a:r>
+          </a:p>
+          <a:p>
+            <a:pPr lvl="1"/>
+            <a:r>
+              <a:rPr lang="en-AU" dirty="0"/>
+              <a:t>How do we want to scale our data?</a:t>
+            </a:r>
+          </a:p>
+          <a:p>
+            <a:pPr lvl="1"/>
+            <a:endParaRPr lang="en-AU" dirty="0"/>
           </a:p>
         </p:txBody>
       </p:sp>
     </p:spTree>
     <p:extLst>
       <p:ext uri="{BB962C8B-B14F-4D97-AF65-F5344CB8AC3E}">
-        <p14:creationId xmlns:p14="http://schemas.microsoft.com/office/powerpoint/2010/main" val="3304551928"/>
+        <p14:creationId xmlns:p14="http://schemas.microsoft.com/office/powerpoint/2010/main" val="1525833955"/>
       </p:ext>
     </p:extLst>
   </p:cSld>
@@ -5208,7 +5248,7 @@
           <p:cNvPr id="2" name="Title 1">
             <a:extLst>
               <a:ext uri="{FF2B5EF4-FFF2-40B4-BE49-F238E27FC236}">
-                <a16:creationId xmlns:a16="http://schemas.microsoft.com/office/drawing/2014/main" id="{C5D0DE2F-6D81-4C17-A822-05399AD057BD}"/>
+                <a16:creationId xmlns:a16="http://schemas.microsoft.com/office/drawing/2014/main" id="{40AE9985-6E9B-441B-B86B-9E5ACCE92E9F}"/>
               </a:ext>
             </a:extLst>
           </p:cNvPr>
@@ -5226,40 +5266,45 @@
           <a:p>
             <a:r>
               <a:rPr lang="en-AU" dirty="0"/>
-              <a:t>Let’s definitely try this</a:t>
-            </a:r>
-          </a:p>
-        </p:txBody>
-      </p:sp>
-      <p:sp>
-        <p:nvSpPr>
-          <p:cNvPr id="3" name="Content Placeholder 2">
-            <a:extLst>
-              <a:ext uri="{FF2B5EF4-FFF2-40B4-BE49-F238E27FC236}">
-                <a16:creationId xmlns:a16="http://schemas.microsoft.com/office/drawing/2014/main" id="{8B634CAC-C865-4095-8760-302523954686}"/>
-              </a:ext>
-            </a:extLst>
-          </p:cNvPr>
-          <p:cNvSpPr>
-            <a:spLocks noGrp="1"/>
-          </p:cNvSpPr>
-          <p:nvPr>
-            <p:ph idx="1"/>
-          </p:nvPr>
-        </p:nvSpPr>
-        <p:spPr/>
-        <p:txBody>
-          <a:bodyPr/>
-          <a:lstStyle/>
-          <a:p>
-            <a:endParaRPr lang="en-AU"/>
-          </a:p>
-        </p:txBody>
-      </p:sp>
+              <a:t>EDA Summary</a:t>
+            </a:r>
+          </a:p>
+        </p:txBody>
+      </p:sp>
+      <p:pic>
+        <p:nvPicPr>
+          <p:cNvPr id="5" name="Picture 4" descr="Diagram&#10;&#10;Description automatically generated">
+            <a:extLst>
+              <a:ext uri="{FF2B5EF4-FFF2-40B4-BE49-F238E27FC236}">
+                <a16:creationId xmlns:a16="http://schemas.microsoft.com/office/drawing/2014/main" id="{D8E23782-8FEB-4836-9CA2-E4D1A601B653}"/>
+              </a:ext>
+            </a:extLst>
+          </p:cNvPr>
+          <p:cNvPicPr>
+            <a:picLocks noChangeAspect="1"/>
+          </p:cNvPicPr>
+          <p:nvPr/>
+        </p:nvPicPr>
+        <p:blipFill>
+          <a:blip r:embed="rId2"/>
+          <a:stretch>
+            <a:fillRect/>
+          </a:stretch>
+        </p:blipFill>
+        <p:spPr>
+          <a:xfrm>
+            <a:off x="638175" y="1690688"/>
+            <a:ext cx="10915650" cy="4029075"/>
+          </a:xfrm>
+          <a:prstGeom prst="rect">
+            <a:avLst/>
+          </a:prstGeom>
+        </p:spPr>
+      </p:pic>
     </p:spTree>
     <p:extLst>
       <p:ext uri="{BB962C8B-B14F-4D97-AF65-F5344CB8AC3E}">
-        <p14:creationId xmlns:p14="http://schemas.microsoft.com/office/powerpoint/2010/main" val="1858896438"/>
+        <p14:creationId xmlns:p14="http://schemas.microsoft.com/office/powerpoint/2010/main" val="2859932023"/>
       </p:ext>
     </p:extLst>
   </p:cSld>
@@ -5270,447 +5315,6 @@
 </file>
 
 <file path=ppt/slides/slide12.xml><?xml version="1.0" encoding="utf-8"?>
-<p:sld xmlns:a="http://schemas.openxmlformats.org/drawingml/2006/main" xmlns:r="http://schemas.openxmlformats.org/officeDocument/2006/relationships" xmlns:p="http://schemas.openxmlformats.org/presentationml/2006/main">
-  <p:cSld>
-    <p:spTree>
-      <p:nvGrpSpPr>
-        <p:cNvPr id="1" name=""/>
-        <p:cNvGrpSpPr/>
-        <p:nvPr/>
-      </p:nvGrpSpPr>
-      <p:grpSpPr>
-        <a:xfrm>
-          <a:off x="0" y="0"/>
-          <a:ext cx="0" cy="0"/>
-          <a:chOff x="0" y="0"/>
-          <a:chExt cx="0" cy="0"/>
-        </a:xfrm>
-      </p:grpSpPr>
-      <p:sp>
-        <p:nvSpPr>
-          <p:cNvPr id="2" name="Title 1">
-            <a:extLst>
-              <a:ext uri="{FF2B5EF4-FFF2-40B4-BE49-F238E27FC236}">
-                <a16:creationId xmlns:a16="http://schemas.microsoft.com/office/drawing/2014/main" id="{E5F6F1FA-4353-4E78-A7B3-4A4B7884F471}"/>
-              </a:ext>
-            </a:extLst>
-          </p:cNvPr>
-          <p:cNvSpPr>
-            <a:spLocks noGrp="1"/>
-          </p:cNvSpPr>
-          <p:nvPr>
-            <p:ph type="title"/>
-          </p:nvPr>
-        </p:nvSpPr>
-        <p:spPr/>
-        <p:txBody>
-          <a:bodyPr/>
-          <a:lstStyle/>
-          <a:p>
-            <a:r>
-              <a:rPr lang="en-AU" dirty="0"/>
-              <a:t>Let’s maybe not include this</a:t>
-            </a:r>
-          </a:p>
-        </p:txBody>
-      </p:sp>
-      <p:sp>
-        <p:nvSpPr>
-          <p:cNvPr id="3" name="Content Placeholder 2">
-            <a:extLst>
-              <a:ext uri="{FF2B5EF4-FFF2-40B4-BE49-F238E27FC236}">
-                <a16:creationId xmlns:a16="http://schemas.microsoft.com/office/drawing/2014/main" id="{41621D0E-8F16-4EAA-ADCB-D9B92A322BF4}"/>
-              </a:ext>
-            </a:extLst>
-          </p:cNvPr>
-          <p:cNvSpPr>
-            <a:spLocks noGrp="1"/>
-          </p:cNvSpPr>
-          <p:nvPr>
-            <p:ph idx="1"/>
-          </p:nvPr>
-        </p:nvSpPr>
-        <p:spPr/>
-        <p:txBody>
-          <a:bodyPr/>
-          <a:lstStyle/>
-          <a:p>
-            <a:endParaRPr lang="en-AU"/>
-          </a:p>
-        </p:txBody>
-      </p:sp>
-    </p:spTree>
-    <p:extLst>
-      <p:ext uri="{BB962C8B-B14F-4D97-AF65-F5344CB8AC3E}">
-        <p14:creationId xmlns:p14="http://schemas.microsoft.com/office/powerpoint/2010/main" val="603438729"/>
-      </p:ext>
-    </p:extLst>
-  </p:cSld>
-  <p:clrMapOvr>
-    <a:masterClrMapping/>
-  </p:clrMapOvr>
-</p:sld>
-</file>
-
-<file path=ppt/slides/slide13.xml><?xml version="1.0" encoding="utf-8"?>
-<p:sld xmlns:a="http://schemas.openxmlformats.org/drawingml/2006/main" xmlns:r="http://schemas.openxmlformats.org/officeDocument/2006/relationships" xmlns:p="http://schemas.openxmlformats.org/presentationml/2006/main">
-  <p:cSld>
-    <p:spTree>
-      <p:nvGrpSpPr>
-        <p:cNvPr id="1" name=""/>
-        <p:cNvGrpSpPr/>
-        <p:nvPr/>
-      </p:nvGrpSpPr>
-      <p:grpSpPr>
-        <a:xfrm>
-          <a:off x="0" y="0"/>
-          <a:ext cx="0" cy="0"/>
-          <a:chOff x="0" y="0"/>
-          <a:chExt cx="0" cy="0"/>
-        </a:xfrm>
-      </p:grpSpPr>
-      <p:sp>
-        <p:nvSpPr>
-          <p:cNvPr id="2" name="Title 1">
-            <a:extLst>
-              <a:ext uri="{FF2B5EF4-FFF2-40B4-BE49-F238E27FC236}">
-                <a16:creationId xmlns:a16="http://schemas.microsoft.com/office/drawing/2014/main" id="{D70239AA-CFA7-47C4-A1EA-57159D42A2B6}"/>
-              </a:ext>
-            </a:extLst>
-          </p:cNvPr>
-          <p:cNvSpPr>
-            <a:spLocks noGrp="1"/>
-          </p:cNvSpPr>
-          <p:nvPr>
-            <p:ph type="title"/>
-          </p:nvPr>
-        </p:nvSpPr>
-        <p:spPr/>
-        <p:txBody>
-          <a:bodyPr/>
-          <a:lstStyle/>
-          <a:p>
-            <a:r>
-              <a:rPr lang="en-AU" dirty="0"/>
-              <a:t>Outliers and scaling</a:t>
-            </a:r>
-          </a:p>
-        </p:txBody>
-      </p:sp>
-      <p:sp>
-        <p:nvSpPr>
-          <p:cNvPr id="3" name="Content Placeholder 2">
-            <a:extLst>
-              <a:ext uri="{FF2B5EF4-FFF2-40B4-BE49-F238E27FC236}">
-                <a16:creationId xmlns:a16="http://schemas.microsoft.com/office/drawing/2014/main" id="{03199408-7B90-4275-9417-824F79462D4B}"/>
-              </a:ext>
-            </a:extLst>
-          </p:cNvPr>
-          <p:cNvSpPr>
-            <a:spLocks noGrp="1"/>
-          </p:cNvSpPr>
-          <p:nvPr>
-            <p:ph idx="1"/>
-          </p:nvPr>
-        </p:nvSpPr>
-        <p:spPr/>
-        <p:txBody>
-          <a:bodyPr>
-            <a:normAutofit/>
-          </a:bodyPr>
-          <a:lstStyle/>
-          <a:p>
-            <a:pPr lvl="1"/>
-            <a:r>
-              <a:rPr lang="en-AU" dirty="0"/>
-              <a:t>Can be determined from either .describe() or scatter matrices</a:t>
-            </a:r>
-          </a:p>
-          <a:p>
-            <a:pPr lvl="1"/>
-            <a:r>
-              <a:rPr lang="en-AU" dirty="0"/>
-              <a:t>Do we need it?</a:t>
-            </a:r>
-          </a:p>
-          <a:p>
-            <a:pPr lvl="1"/>
-            <a:r>
-              <a:rPr lang="en-AU" dirty="0"/>
-              <a:t>Which algorithm should we use, and do we need to scale our data? (technically yes, it is always good practice)</a:t>
-            </a:r>
-          </a:p>
-          <a:p>
-            <a:pPr lvl="1"/>
-            <a:r>
-              <a:rPr lang="en-AU" dirty="0"/>
-              <a:t>How do we want to scale our data?</a:t>
-            </a:r>
-          </a:p>
-          <a:p>
-            <a:pPr lvl="1"/>
-            <a:endParaRPr lang="en-AU" dirty="0"/>
-          </a:p>
-        </p:txBody>
-      </p:sp>
-    </p:spTree>
-    <p:extLst>
-      <p:ext uri="{BB962C8B-B14F-4D97-AF65-F5344CB8AC3E}">
-        <p14:creationId xmlns:p14="http://schemas.microsoft.com/office/powerpoint/2010/main" val="1525833955"/>
-      </p:ext>
-    </p:extLst>
-  </p:cSld>
-  <p:clrMapOvr>
-    <a:masterClrMapping/>
-  </p:clrMapOvr>
-</p:sld>
-</file>
-
-<file path=ppt/slides/slide14.xml><?xml version="1.0" encoding="utf-8"?>
-<p:sld xmlns:a="http://schemas.openxmlformats.org/drawingml/2006/main" xmlns:r="http://schemas.openxmlformats.org/officeDocument/2006/relationships" xmlns:p="http://schemas.openxmlformats.org/presentationml/2006/main">
-  <p:cSld>
-    <p:spTree>
-      <p:nvGrpSpPr>
-        <p:cNvPr id="1" name=""/>
-        <p:cNvGrpSpPr/>
-        <p:nvPr/>
-      </p:nvGrpSpPr>
-      <p:grpSpPr>
-        <a:xfrm>
-          <a:off x="0" y="0"/>
-          <a:ext cx="0" cy="0"/>
-          <a:chOff x="0" y="0"/>
-          <a:chExt cx="0" cy="0"/>
-        </a:xfrm>
-      </p:grpSpPr>
-      <p:sp>
-        <p:nvSpPr>
-          <p:cNvPr id="2" name="Title 1">
-            <a:extLst>
-              <a:ext uri="{FF2B5EF4-FFF2-40B4-BE49-F238E27FC236}">
-                <a16:creationId xmlns:a16="http://schemas.microsoft.com/office/drawing/2014/main" id="{1285CEAA-2848-4F5B-9A9F-0EF6AC6AC432}"/>
-              </a:ext>
-            </a:extLst>
-          </p:cNvPr>
-          <p:cNvSpPr>
-            <a:spLocks noGrp="1"/>
-          </p:cNvSpPr>
-          <p:nvPr>
-            <p:ph type="title"/>
-          </p:nvPr>
-        </p:nvSpPr>
-        <p:spPr/>
-        <p:txBody>
-          <a:bodyPr/>
-          <a:lstStyle/>
-          <a:p>
-            <a:r>
-              <a:rPr lang="en-AU" dirty="0"/>
-              <a:t>EDA framework</a:t>
-            </a:r>
-          </a:p>
-        </p:txBody>
-      </p:sp>
-      <p:sp>
-        <p:nvSpPr>
-          <p:cNvPr id="3" name="Content Placeholder 2">
-            <a:extLst>
-              <a:ext uri="{FF2B5EF4-FFF2-40B4-BE49-F238E27FC236}">
-                <a16:creationId xmlns:a16="http://schemas.microsoft.com/office/drawing/2014/main" id="{FDFDB44C-0499-49BE-82CD-A85AD0DF5E30}"/>
-              </a:ext>
-            </a:extLst>
-          </p:cNvPr>
-          <p:cNvSpPr>
-            <a:spLocks noGrp="1"/>
-          </p:cNvSpPr>
-          <p:nvPr>
-            <p:ph idx="1"/>
-          </p:nvPr>
-        </p:nvSpPr>
-        <p:spPr/>
-        <p:txBody>
-          <a:bodyPr>
-            <a:normAutofit/>
-          </a:bodyPr>
-          <a:lstStyle/>
-          <a:p>
-            <a:pPr marL="514350" indent="-514350" algn="just">
-              <a:buAutoNum type="arabicPeriod"/>
-            </a:pPr>
-            <a:r>
-              <a:rPr lang="en-AU" dirty="0">
-                <a:solidFill>
-                  <a:srgbClr val="7E7E7E"/>
-                </a:solidFill>
-                <a:latin typeface="Poppins"/>
-              </a:rPr>
-              <a:t>Clustering (optional)</a:t>
-            </a:r>
-            <a:endParaRPr lang="en-AU" b="0" i="0" dirty="0">
-              <a:solidFill>
-                <a:srgbClr val="7E7E7E"/>
-              </a:solidFill>
-              <a:effectLst/>
-              <a:latin typeface="Poppins"/>
-            </a:endParaRPr>
-          </a:p>
-          <a:p>
-            <a:pPr marL="514350" indent="-514350" algn="just">
-              <a:buAutoNum type="arabicPeriod"/>
-            </a:pPr>
-            <a:r>
-              <a:rPr lang="en-AU" b="0" i="0" dirty="0">
-                <a:solidFill>
-                  <a:srgbClr val="7E7E7E"/>
-                </a:solidFill>
-                <a:effectLst/>
-                <a:latin typeface="Poppins"/>
-              </a:rPr>
-              <a:t>.describe()</a:t>
-            </a:r>
-          </a:p>
-          <a:p>
-            <a:pPr marL="514350" indent="-514350" algn="just">
-              <a:buAutoNum type="arabicPeriod"/>
-            </a:pPr>
-            <a:r>
-              <a:rPr lang="en-AU" dirty="0">
-                <a:solidFill>
-                  <a:srgbClr val="7E7E7E"/>
-                </a:solidFill>
-                <a:latin typeface="Poppins"/>
-              </a:rPr>
-              <a:t>.</a:t>
-            </a:r>
-            <a:r>
-              <a:rPr lang="en-AU" dirty="0" err="1">
-                <a:solidFill>
-                  <a:srgbClr val="7E7E7E"/>
-                </a:solidFill>
-                <a:latin typeface="Poppins"/>
-              </a:rPr>
-              <a:t>agg</a:t>
-            </a:r>
-            <a:r>
-              <a:rPr lang="en-AU" dirty="0">
-                <a:solidFill>
-                  <a:srgbClr val="7E7E7E"/>
-                </a:solidFill>
-                <a:latin typeface="Poppins"/>
-              </a:rPr>
-              <a:t>()</a:t>
-            </a:r>
-          </a:p>
-          <a:p>
-            <a:pPr marL="514350" indent="-514350" algn="just">
-              <a:buAutoNum type="arabicPeriod"/>
-            </a:pPr>
-            <a:r>
-              <a:rPr lang="en-AU" b="0" i="0" dirty="0" err="1">
-                <a:solidFill>
-                  <a:srgbClr val="7E7E7E"/>
-                </a:solidFill>
-                <a:effectLst/>
-                <a:latin typeface="Poppins"/>
-              </a:rPr>
-              <a:t>Pd.qcut</a:t>
-            </a:r>
-            <a:r>
-              <a:rPr lang="en-AU" b="0" i="0" dirty="0">
-                <a:solidFill>
-                  <a:srgbClr val="7E7E7E"/>
-                </a:solidFill>
-                <a:effectLst/>
-                <a:latin typeface="Poppins"/>
-              </a:rPr>
-              <a:t>()</a:t>
-            </a:r>
-          </a:p>
-          <a:p>
-            <a:pPr marL="514350" indent="-514350" algn="just">
-              <a:buAutoNum type="arabicPeriod"/>
-            </a:pPr>
-            <a:r>
-              <a:rPr lang="en-AU" dirty="0">
-                <a:solidFill>
-                  <a:srgbClr val="7E7E7E"/>
-                </a:solidFill>
-                <a:latin typeface="Poppins"/>
-              </a:rPr>
-              <a:t>Scatter matrix with cluster labels</a:t>
-            </a:r>
-          </a:p>
-          <a:p>
-            <a:pPr marL="514350" indent="-514350" algn="just">
-              <a:buAutoNum type="arabicPeriod"/>
-            </a:pPr>
-            <a:r>
-              <a:rPr lang="en-AU" b="0" i="0" dirty="0">
-                <a:solidFill>
-                  <a:srgbClr val="7E7E7E"/>
-                </a:solidFill>
-                <a:effectLst/>
-                <a:latin typeface="Poppins"/>
-              </a:rPr>
-              <a:t>It is not necessarily linear</a:t>
-            </a:r>
-            <a:r>
-              <a:rPr lang="en-AU" dirty="0">
-                <a:solidFill>
-                  <a:srgbClr val="7E7E7E"/>
-                </a:solidFill>
-                <a:latin typeface="Poppins"/>
-              </a:rPr>
-              <a:t>, more iterative</a:t>
-            </a:r>
-          </a:p>
-          <a:p>
-            <a:pPr marL="514350" indent="-514350" algn="just">
-              <a:buAutoNum type="arabicPeriod"/>
-            </a:pPr>
-            <a:r>
-              <a:rPr lang="en-AU" b="0" i="0" dirty="0">
-                <a:solidFill>
-                  <a:srgbClr val="7E7E7E"/>
-                </a:solidFill>
-                <a:effectLst/>
-                <a:latin typeface="Poppins"/>
-              </a:rPr>
-              <a:t>Pa</a:t>
-            </a:r>
-            <a:r>
-              <a:rPr lang="en-AU" dirty="0">
-                <a:solidFill>
-                  <a:srgbClr val="7E7E7E"/>
-                </a:solidFill>
-                <a:latin typeface="Poppins"/>
-              </a:rPr>
-              <a:t>ndas profiling</a:t>
-            </a:r>
-            <a:endParaRPr lang="en-AU" b="0" i="0" dirty="0">
-              <a:solidFill>
-                <a:srgbClr val="7E7E7E"/>
-              </a:solidFill>
-              <a:effectLst/>
-              <a:latin typeface="Poppins"/>
-            </a:endParaRPr>
-          </a:p>
-        </p:txBody>
-      </p:sp>
-    </p:spTree>
-    <p:extLst>
-      <p:ext uri="{BB962C8B-B14F-4D97-AF65-F5344CB8AC3E}">
-        <p14:creationId xmlns:p14="http://schemas.microsoft.com/office/powerpoint/2010/main" val="1658470203"/>
-      </p:ext>
-    </p:extLst>
-  </p:cSld>
-  <p:clrMapOvr>
-    <a:masterClrMapping/>
-  </p:clrMapOvr>
-</p:sld>
-</file>
-
-<file path=ppt/slides/slide15.xml><?xml version="1.0" encoding="utf-8"?>
 <p:sld xmlns:a="http://schemas.openxmlformats.org/drawingml/2006/main" xmlns:r="http://schemas.openxmlformats.org/officeDocument/2006/relationships" xmlns:p="http://schemas.openxmlformats.org/presentationml/2006/main">
   <p:cSld>
     <p:spTree>
@@ -7407,7 +7011,10 @@
           <a:bodyPr/>
           <a:lstStyle/>
           <a:p>
-            <a:endParaRPr lang="en-AU"/>
+            <a:r>
+              <a:rPr lang="en-AU" dirty="0"/>
+              <a:t>TO THE NOTEBOOK</a:t>
+            </a:r>
           </a:p>
         </p:txBody>
       </p:sp>

</xml_diff>

<commit_message>
updated slides and example to rerun
</commit_message>
<xml_diff>
--- a/Problem Formulation & EDA.pptx
+++ b/Problem Formulation & EDA.pptx
@@ -5,7 +5,7 @@
     <p:sldMasterId id="2147483648" r:id="rId1"/>
   </p:sldMasterIdLst>
   <p:notesMasterIdLst>
-    <p:notesMasterId r:id="rId19"/>
+    <p:notesMasterId r:id="rId20"/>
   </p:notesMasterIdLst>
   <p:sldIdLst>
     <p:sldId id="256" r:id="rId2"/>
@@ -25,6 +25,7 @@
     <p:sldId id="270" r:id="rId16"/>
     <p:sldId id="271" r:id="rId17"/>
     <p:sldId id="264" r:id="rId18"/>
+    <p:sldId id="278" r:id="rId19"/>
   </p:sldIdLst>
   <p:sldSz cx="12192000" cy="6858000"/>
   <p:notesSz cx="6858000" cy="9144000"/>
@@ -5730,7 +5731,7 @@
           <a:lstStyle/>
           <a:p>
             <a:r>
-              <a:rPr lang="en-AU" dirty="0">
+              <a:rPr lang="en-AU" b="1" dirty="0">
                 <a:latin typeface="Roboto" panose="02000000000000000000" pitchFamily="2" charset="0"/>
                 <a:ea typeface="Roboto" panose="02000000000000000000" pitchFamily="2" charset="0"/>
               </a:rPr>
@@ -5927,7 +5928,7 @@
           <a:lstStyle/>
           <a:p>
             <a:r>
-              <a:rPr lang="en-AU" dirty="0">
+              <a:rPr lang="en-AU" b="1" dirty="0">
                 <a:latin typeface="Roboto" panose="02000000000000000000" pitchFamily="2" charset="0"/>
                 <a:ea typeface="Roboto" panose="02000000000000000000" pitchFamily="2" charset="0"/>
               </a:rPr>
@@ -6085,7 +6086,7 @@
           <a:lstStyle/>
           <a:p>
             <a:r>
-              <a:rPr lang="en-AU" dirty="0">
+              <a:rPr lang="en-AU" b="1" dirty="0">
                 <a:latin typeface="Roboto" panose="02000000000000000000" pitchFamily="2" charset="0"/>
                 <a:ea typeface="Roboto" panose="02000000000000000000" pitchFamily="2" charset="0"/>
               </a:rPr>
@@ -6398,7 +6399,7 @@
           <a:lstStyle/>
           <a:p>
             <a:r>
-              <a:rPr lang="en-AU" dirty="0">
+              <a:rPr lang="en-AU" b="1" dirty="0">
                 <a:latin typeface="Roboto" panose="02000000000000000000" pitchFamily="2" charset="0"/>
                 <a:ea typeface="Roboto" panose="02000000000000000000" pitchFamily="2" charset="0"/>
               </a:rPr>
@@ -6426,7 +6427,7 @@
         <p:spPr/>
         <p:txBody>
           <a:bodyPr>
-            <a:normAutofit fontScale="85000" lnSpcReduction="20000"/>
+            <a:normAutofit lnSpcReduction="10000"/>
           </a:bodyPr>
           <a:lstStyle/>
           <a:p>
@@ -6435,41 +6436,55 @@
                 <a:latin typeface="Roboto" panose="02000000000000000000" pitchFamily="2" charset="0"/>
                 <a:ea typeface="Roboto" panose="02000000000000000000" pitchFamily="2" charset="0"/>
               </a:rPr>
+              <a:t>Toolset</a:t>
+            </a:r>
+          </a:p>
+          <a:p>
+            <a:pPr lvl="2"/>
+            <a:r>
+              <a:rPr lang="en-AU" sz="1900" dirty="0">
+                <a:latin typeface="Roboto Light" panose="02000000000000000000" pitchFamily="2" charset="0"/>
+                <a:ea typeface="Roboto Light" panose="02000000000000000000" pitchFamily="2" charset="0"/>
+              </a:rPr>
               <a:t>.describe()</a:t>
             </a:r>
           </a:p>
           <a:p>
-            <a:r>
-              <a:rPr lang="en-AU" sz="3000" b="1" dirty="0">
-                <a:latin typeface="Roboto" panose="02000000000000000000" pitchFamily="2" charset="0"/>
-                <a:ea typeface="Roboto" panose="02000000000000000000" pitchFamily="2" charset="0"/>
+            <a:pPr lvl="2"/>
+            <a:r>
+              <a:rPr lang="en-AU" sz="1900" dirty="0">
+                <a:latin typeface="Roboto Light" panose="02000000000000000000" pitchFamily="2" charset="0"/>
+                <a:ea typeface="Roboto Light" panose="02000000000000000000" pitchFamily="2" charset="0"/>
               </a:rPr>
               <a:t>UDFs</a:t>
             </a:r>
           </a:p>
           <a:p>
-            <a:r>
-              <a:rPr lang="en-AU" sz="3000" b="1" dirty="0">
-                <a:latin typeface="Roboto" panose="02000000000000000000" pitchFamily="2" charset="0"/>
-                <a:ea typeface="Roboto" panose="02000000000000000000" pitchFamily="2" charset="0"/>
+            <a:pPr lvl="2"/>
+            <a:r>
+              <a:rPr lang="en-AU" sz="1900" dirty="0">
+                <a:latin typeface="Roboto Light" panose="02000000000000000000" pitchFamily="2" charset="0"/>
+                <a:ea typeface="Roboto Light" panose="02000000000000000000" pitchFamily="2" charset="0"/>
               </a:rPr>
               <a:t>Histograms/KDE</a:t>
             </a:r>
           </a:p>
           <a:p>
-            <a:r>
-              <a:rPr lang="en-AU" sz="3000" b="1" dirty="0">
-                <a:latin typeface="Roboto" panose="02000000000000000000" pitchFamily="2" charset="0"/>
-                <a:ea typeface="Roboto" panose="02000000000000000000" pitchFamily="2" charset="0"/>
+            <a:pPr lvl="2"/>
+            <a:r>
+              <a:rPr lang="en-AU" sz="1900" dirty="0">
+                <a:latin typeface="Roboto Light" panose="02000000000000000000" pitchFamily="2" charset="0"/>
+                <a:ea typeface="Roboto Light" panose="02000000000000000000" pitchFamily="2" charset="0"/>
               </a:rPr>
               <a:t>Scatter matrix</a:t>
             </a:r>
           </a:p>
           <a:p>
-            <a:r>
-              <a:rPr lang="en-AU" sz="3000" b="1" dirty="0">
-                <a:latin typeface="Roboto" panose="02000000000000000000" pitchFamily="2" charset="0"/>
-                <a:ea typeface="Roboto" panose="02000000000000000000" pitchFamily="2" charset="0"/>
+            <a:pPr lvl="2"/>
+            <a:r>
+              <a:rPr lang="en-AU" sz="1900" dirty="0">
+                <a:latin typeface="Roboto Light" panose="02000000000000000000" pitchFamily="2" charset="0"/>
+                <a:ea typeface="Roboto Light" panose="02000000000000000000" pitchFamily="2" charset="0"/>
               </a:rPr>
               <a:t>Correlation (Pearson, Kendall, Spearman)</a:t>
             </a:r>
@@ -6478,12 +6493,6 @@
             <a:pPr marL="0" indent="0">
               <a:buNone/>
             </a:pPr>
-            <a:endParaRPr lang="en-AU" sz="3000" b="1" dirty="0">
-              <a:latin typeface="Roboto" panose="02000000000000000000" pitchFamily="2" charset="0"/>
-              <a:ea typeface="Roboto" panose="02000000000000000000" pitchFamily="2" charset="0"/>
-            </a:endParaRPr>
-          </a:p>
-          <a:p>
             <a:endParaRPr lang="en-AU" sz="3000" b="1" dirty="0">
               <a:latin typeface="Roboto" panose="02000000000000000000" pitchFamily="2" charset="0"/>
               <a:ea typeface="Roboto" panose="02000000000000000000" pitchFamily="2" charset="0"/>
@@ -6595,21 +6604,21 @@
           <a:lstStyle/>
           <a:p>
             <a:r>
-              <a:rPr lang="en-AU" dirty="0">
+              <a:rPr lang="en-AU" b="1" dirty="0">
                 <a:latin typeface="Roboto" panose="02000000000000000000" pitchFamily="2" charset="0"/>
                 <a:ea typeface="Roboto" panose="02000000000000000000" pitchFamily="2" charset="0"/>
               </a:rPr>
               <a:t>Example: Travel insurance </a:t>
             </a:r>
             <a:r>
-              <a:rPr lang="en-AU" dirty="0">
+              <a:rPr lang="en-AU" b="1" dirty="0">
                 <a:latin typeface="Roboto" panose="02000000000000000000" pitchFamily="2" charset="0"/>
                 <a:ea typeface="Roboto" panose="02000000000000000000" pitchFamily="2" charset="0"/>
                 <a:hlinkClick r:id="rId3"/>
               </a:rPr>
               <a:t>dataset</a:t>
             </a:r>
-            <a:endParaRPr lang="en-AU" dirty="0">
+            <a:endParaRPr lang="en-AU" b="1" dirty="0">
               <a:latin typeface="Roboto" panose="02000000000000000000" pitchFamily="2" charset="0"/>
               <a:ea typeface="Roboto" panose="02000000000000000000" pitchFamily="2" charset="0"/>
             </a:endParaRPr>
@@ -6855,7 +6864,7 @@
           <a:lstStyle/>
           <a:p>
             <a:r>
-              <a:rPr lang="en-AU" dirty="0">
+              <a:rPr lang="en-AU" b="1" dirty="0">
                 <a:latin typeface="Roboto" panose="02000000000000000000" pitchFamily="2" charset="0"/>
                 <a:ea typeface="Roboto" panose="02000000000000000000" pitchFamily="2" charset="0"/>
               </a:rPr>
@@ -6916,7 +6925,10 @@
           <a:lstStyle/>
           <a:p>
             <a:r>
-              <a:rPr lang="en-AU" dirty="0"/>
+              <a:rPr lang="en-AU" b="1" dirty="0">
+                <a:latin typeface="Roboto" panose="02000000000000000000" pitchFamily="2" charset="0"/>
+                <a:ea typeface="Roboto" panose="02000000000000000000" pitchFamily="2" charset="0"/>
+              </a:rPr>
               <a:t>EDA Summary</a:t>
             </a:r>
           </a:p>
@@ -7004,7 +7016,10 @@
           <a:lstStyle/>
           <a:p>
             <a:r>
-              <a:rPr lang="en-AU" dirty="0"/>
+              <a:rPr lang="en-AU" b="1" dirty="0">
+                <a:latin typeface="Roboto" panose="02000000000000000000" pitchFamily="2" charset="0"/>
+                <a:ea typeface="Roboto" panose="02000000000000000000" pitchFamily="2" charset="0"/>
+              </a:rPr>
               <a:t>Summary</a:t>
             </a:r>
           </a:p>
@@ -7024,8 +7039,8 @@
         </p:nvSpPr>
         <p:spPr>
           <a:xfrm>
-            <a:off x="838200" y="3762375"/>
-            <a:ext cx="10306050" cy="369332"/>
+            <a:off x="838200" y="3237940"/>
+            <a:ext cx="11049000" cy="369332"/>
           </a:xfrm>
           <a:prstGeom prst="rect">
             <a:avLst/>
@@ -7039,8 +7054,123 @@
           <a:lstStyle/>
           <a:p>
             <a:r>
-              <a:rPr lang="en-AU" dirty="0"/>
-              <a:t>Define problem -&gt; collect -&gt; clean -&gt; EDA -&gt; feature engineer -&gt; model -&gt; validate/test -&gt; present -&gt; monitor</a:t>
+              <a:rPr lang="en-AU" b="1" dirty="0">
+                <a:latin typeface="Roboto" panose="02000000000000000000" pitchFamily="2" charset="0"/>
+                <a:ea typeface="Roboto" panose="02000000000000000000" pitchFamily="2" charset="0"/>
+              </a:rPr>
+              <a:t>Define problem </a:t>
+            </a:r>
+            <a:r>
+              <a:rPr lang="en-AU" dirty="0">
+                <a:latin typeface="Roboto" panose="02000000000000000000" pitchFamily="2" charset="0"/>
+                <a:ea typeface="Roboto" panose="02000000000000000000" pitchFamily="2" charset="0"/>
+              </a:rPr>
+              <a:t>-&gt; </a:t>
+            </a:r>
+            <a:r>
+              <a:rPr lang="en-AU" b="1" dirty="0">
+                <a:latin typeface="Roboto" panose="02000000000000000000" pitchFamily="2" charset="0"/>
+                <a:ea typeface="Roboto" panose="02000000000000000000" pitchFamily="2" charset="0"/>
+              </a:rPr>
+              <a:t>collect</a:t>
+            </a:r>
+            <a:r>
+              <a:rPr lang="en-AU" dirty="0">
+                <a:latin typeface="Roboto" panose="02000000000000000000" pitchFamily="2" charset="0"/>
+                <a:ea typeface="Roboto" panose="02000000000000000000" pitchFamily="2" charset="0"/>
+              </a:rPr>
+              <a:t> -&gt; </a:t>
+            </a:r>
+            <a:r>
+              <a:rPr lang="en-AU" b="1" dirty="0">
+                <a:latin typeface="Roboto" panose="02000000000000000000" pitchFamily="2" charset="0"/>
+                <a:ea typeface="Roboto" panose="02000000000000000000" pitchFamily="2" charset="0"/>
+              </a:rPr>
+              <a:t>clean</a:t>
+            </a:r>
+            <a:r>
+              <a:rPr lang="en-AU" dirty="0">
+                <a:latin typeface="Roboto" panose="02000000000000000000" pitchFamily="2" charset="0"/>
+                <a:ea typeface="Roboto" panose="02000000000000000000" pitchFamily="2" charset="0"/>
+              </a:rPr>
+              <a:t> -&gt; </a:t>
+            </a:r>
+            <a:r>
+              <a:rPr lang="en-AU" b="1" dirty="0">
+                <a:latin typeface="Roboto" panose="02000000000000000000" pitchFamily="2" charset="0"/>
+                <a:ea typeface="Roboto" panose="02000000000000000000" pitchFamily="2" charset="0"/>
+              </a:rPr>
+              <a:t>EDA</a:t>
+            </a:r>
+            <a:r>
+              <a:rPr lang="en-AU" dirty="0">
+                <a:latin typeface="Roboto" panose="02000000000000000000" pitchFamily="2" charset="0"/>
+                <a:ea typeface="Roboto" panose="02000000000000000000" pitchFamily="2" charset="0"/>
+              </a:rPr>
+              <a:t> -&gt; </a:t>
+            </a:r>
+            <a:r>
+              <a:rPr lang="en-AU" b="1" dirty="0">
+                <a:latin typeface="Roboto" panose="02000000000000000000" pitchFamily="2" charset="0"/>
+                <a:ea typeface="Roboto" panose="02000000000000000000" pitchFamily="2" charset="0"/>
+              </a:rPr>
+              <a:t>feature engineer </a:t>
+            </a:r>
+            <a:r>
+              <a:rPr lang="en-AU" dirty="0">
+                <a:latin typeface="Roboto" panose="02000000000000000000" pitchFamily="2" charset="0"/>
+                <a:ea typeface="Roboto" panose="02000000000000000000" pitchFamily="2" charset="0"/>
+              </a:rPr>
+              <a:t>-&gt; </a:t>
+            </a:r>
+            <a:r>
+              <a:rPr lang="en-AU" b="1" dirty="0">
+                <a:latin typeface="Roboto" panose="02000000000000000000" pitchFamily="2" charset="0"/>
+                <a:ea typeface="Roboto" panose="02000000000000000000" pitchFamily="2" charset="0"/>
+              </a:rPr>
+              <a:t>model</a:t>
+            </a:r>
+            <a:r>
+              <a:rPr lang="en-AU" dirty="0">
+                <a:latin typeface="Roboto" panose="02000000000000000000" pitchFamily="2" charset="0"/>
+                <a:ea typeface="Roboto" panose="02000000000000000000" pitchFamily="2" charset="0"/>
+              </a:rPr>
+              <a:t> -&gt; </a:t>
+            </a:r>
+            <a:r>
+              <a:rPr lang="en-AU" b="1" dirty="0">
+                <a:latin typeface="Roboto" panose="02000000000000000000" pitchFamily="2" charset="0"/>
+                <a:ea typeface="Roboto" panose="02000000000000000000" pitchFamily="2" charset="0"/>
+              </a:rPr>
+              <a:t>validate/test </a:t>
+            </a:r>
+            <a:r>
+              <a:rPr lang="en-AU" dirty="0">
+                <a:latin typeface="Roboto" panose="02000000000000000000" pitchFamily="2" charset="0"/>
+                <a:ea typeface="Roboto" panose="02000000000000000000" pitchFamily="2" charset="0"/>
+              </a:rPr>
+              <a:t>-&gt; </a:t>
+            </a:r>
+            <a:r>
+              <a:rPr lang="en-AU" b="1" dirty="0">
+                <a:latin typeface="Roboto" panose="02000000000000000000" pitchFamily="2" charset="0"/>
+                <a:ea typeface="Roboto" panose="02000000000000000000" pitchFamily="2" charset="0"/>
+              </a:rPr>
+              <a:t>present</a:t>
+            </a:r>
+            <a:r>
+              <a:rPr lang="en-AU" dirty="0">
+                <a:latin typeface="Roboto" panose="02000000000000000000" pitchFamily="2" charset="0"/>
+                <a:ea typeface="Roboto" panose="02000000000000000000" pitchFamily="2" charset="0"/>
+              </a:rPr>
+              <a:t> -&gt; </a:t>
+            </a:r>
+            <a:r>
+              <a:rPr lang="en-AU" b="1" dirty="0">
+                <a:latin typeface="Roboto" panose="02000000000000000000" pitchFamily="2" charset="0"/>
+                <a:ea typeface="Roboto" panose="02000000000000000000" pitchFamily="2" charset="0"/>
+              </a:rPr>
+              <a:t>monitor</a:t>
             </a:r>
           </a:p>
         </p:txBody>
@@ -7059,8 +7189,108 @@
         </p:nvSpPr>
         <p:spPr>
           <a:xfrm>
-            <a:off x="1685925" y="4357687"/>
-            <a:ext cx="5629275" cy="1099583"/>
+            <a:off x="1685925" y="3833252"/>
+            <a:ext cx="6162675" cy="1099583"/>
+          </a:xfrm>
+          <a:prstGeom prst="curvedUpArrow">
+            <a:avLst/>
+          </a:prstGeom>
+          <a:ln>
+            <a:noFill/>
+          </a:ln>
+        </p:spPr>
+        <p:style>
+          <a:lnRef idx="2">
+            <a:schemeClr val="accent1">
+              <a:shade val="50000"/>
+            </a:schemeClr>
+          </a:lnRef>
+          <a:fillRef idx="1">
+            <a:schemeClr val="accent1"/>
+          </a:fillRef>
+          <a:effectRef idx="0">
+            <a:schemeClr val="accent1"/>
+          </a:effectRef>
+          <a:fontRef idx="minor">
+            <a:schemeClr val="lt1"/>
+          </a:fontRef>
+        </p:style>
+        <p:txBody>
+          <a:bodyPr rtlCol="0" anchor="ctr"/>
+          <a:lstStyle/>
+          <a:p>
+            <a:pPr algn="ctr"/>
+            <a:endParaRPr lang="en-AU" dirty="0">
+              <a:solidFill>
+                <a:schemeClr val="tx1"/>
+              </a:solidFill>
+            </a:endParaRPr>
+          </a:p>
+        </p:txBody>
+      </p:sp>
+      <p:sp>
+        <p:nvSpPr>
+          <p:cNvPr id="18" name="TextBox 17">
+            <a:extLst>
+              <a:ext uri="{FF2B5EF4-FFF2-40B4-BE49-F238E27FC236}">
+                <a16:creationId xmlns:a16="http://schemas.microsoft.com/office/drawing/2014/main" id="{D9FD5A2C-31E0-4B72-940F-CF0E8C16EF33}"/>
+              </a:ext>
+            </a:extLst>
+          </p:cNvPr>
+          <p:cNvSpPr txBox="1"/>
+          <p:nvPr/>
+        </p:nvSpPr>
+        <p:spPr>
+          <a:xfrm>
+            <a:off x="5693569" y="4894128"/>
+            <a:ext cx="2471737" cy="646331"/>
+          </a:xfrm>
+          <a:prstGeom prst="rect">
+            <a:avLst/>
+          </a:prstGeom>
+          <a:noFill/>
+        </p:spPr>
+        <p:txBody>
+          <a:bodyPr wrap="square" rtlCol="0">
+            <a:spAutoFit/>
+          </a:bodyPr>
+          <a:lstStyle/>
+          <a:p>
+            <a:r>
+              <a:rPr lang="en-AU" dirty="0">
+                <a:latin typeface="Roboto Light" panose="02000000000000000000" pitchFamily="2" charset="0"/>
+                <a:ea typeface="Roboto Light" panose="02000000000000000000" pitchFamily="2" charset="0"/>
+              </a:rPr>
+              <a:t>Level of interpretability</a:t>
+            </a:r>
+          </a:p>
+          <a:p>
+            <a:r>
+              <a:rPr lang="en-AU" dirty="0">
+                <a:latin typeface="Roboto Light" panose="02000000000000000000" pitchFamily="2" charset="0"/>
+                <a:ea typeface="Roboto Light" panose="02000000000000000000" pitchFamily="2" charset="0"/>
+              </a:rPr>
+              <a:t>KPI thresholds</a:t>
+            </a:r>
+          </a:p>
+        </p:txBody>
+      </p:sp>
+      <p:sp>
+        <p:nvSpPr>
+          <p:cNvPr id="19" name="Arrow: Curved Up 18">
+            <a:extLst>
+              <a:ext uri="{FF2B5EF4-FFF2-40B4-BE49-F238E27FC236}">
+                <a16:creationId xmlns:a16="http://schemas.microsoft.com/office/drawing/2014/main" id="{5EF7A0CB-BA70-49FA-8F91-4075EDFD93B4}"/>
+              </a:ext>
+            </a:extLst>
+          </p:cNvPr>
+          <p:cNvSpPr/>
+          <p:nvPr/>
+        </p:nvSpPr>
+        <p:spPr>
+          <a:xfrm>
+            <a:off x="1685925" y="3833251"/>
+            <a:ext cx="3358515" cy="1099583"/>
           </a:xfrm>
           <a:prstGeom prst="curvedUpArrow">
             <a:avLst/>
@@ -7097,10 +7327,10 @@
       </p:sp>
       <p:sp>
         <p:nvSpPr>
-          <p:cNvPr id="18" name="TextBox 17">
-            <a:extLst>
-              <a:ext uri="{FF2B5EF4-FFF2-40B4-BE49-F238E27FC236}">
-                <a16:creationId xmlns:a16="http://schemas.microsoft.com/office/drawing/2014/main" id="{D9FD5A2C-31E0-4B72-940F-CF0E8C16EF33}"/>
+          <p:cNvPr id="20" name="TextBox 19">
+            <a:extLst>
+              <a:ext uri="{FF2B5EF4-FFF2-40B4-BE49-F238E27FC236}">
+                <a16:creationId xmlns:a16="http://schemas.microsoft.com/office/drawing/2014/main" id="{89E4B215-6A80-4FA2-9656-D17B7FDB9874}"/>
               </a:ext>
             </a:extLst>
           </p:cNvPr>
@@ -7109,8 +7339,8 @@
         </p:nvSpPr>
         <p:spPr>
           <a:xfrm>
-            <a:off x="4743450" y="5457269"/>
-            <a:ext cx="2471737" cy="646331"/>
+            <a:off x="4704080" y="1831107"/>
+            <a:ext cx="2271431" cy="923330"/>
           </a:xfrm>
           <a:prstGeom prst="rect">
             <a:avLst/>
@@ -7124,24 +7354,24 @@
           <a:lstStyle/>
           <a:p>
             <a:r>
-              <a:rPr lang="en-AU" dirty="0"/>
-              <a:t>Level of interpretability</a:t>
-            </a:r>
-          </a:p>
-          <a:p>
-            <a:r>
-              <a:rPr lang="en-AU" dirty="0"/>
-              <a:t>KPI thresholds</a:t>
-            </a:r>
-          </a:p>
-        </p:txBody>
-      </p:sp>
-      <p:sp>
-        <p:nvSpPr>
-          <p:cNvPr id="19" name="Arrow: Curved Up 18">
-            <a:extLst>
-              <a:ext uri="{FF2B5EF4-FFF2-40B4-BE49-F238E27FC236}">
-                <a16:creationId xmlns:a16="http://schemas.microsoft.com/office/drawing/2014/main" id="{5EF7A0CB-BA70-49FA-8F91-4075EDFD93B4}"/>
+              <a:rPr lang="en-AU" dirty="0">
+                <a:latin typeface="Roboto Light" panose="02000000000000000000" pitchFamily="2" charset="0"/>
+                <a:ea typeface="Roboto Light" panose="02000000000000000000" pitchFamily="2" charset="0"/>
+              </a:rPr>
+              <a:t>Follow up from 4 buckets</a:t>
+            </a:r>
+          </a:p>
+          <a:p>
+            <a:endParaRPr lang="en-AU" dirty="0"/>
+          </a:p>
+        </p:txBody>
+      </p:sp>
+      <p:sp>
+        <p:nvSpPr>
+          <p:cNvPr id="22" name="Arrow: U-Turn 21">
+            <a:extLst>
+              <a:ext uri="{FF2B5EF4-FFF2-40B4-BE49-F238E27FC236}">
+                <a16:creationId xmlns:a16="http://schemas.microsoft.com/office/drawing/2014/main" id="{3DEFA7E2-DB0C-43C0-8078-E4F04CD785D5}"/>
               </a:ext>
             </a:extLst>
           </p:cNvPr>
@@ -7150,12 +7380,18 @@
         </p:nvSpPr>
         <p:spPr>
           <a:xfrm>
-            <a:off x="1685925" y="4357686"/>
-            <a:ext cx="3057525" cy="1099583"/>
+            <a:off x="4704080" y="2571190"/>
+            <a:ext cx="1590040" cy="532716"/>
           </a:xfrm>
-          <a:prstGeom prst="curvedUpArrow">
+          <a:prstGeom prst="uturnArrow">
             <a:avLst/>
           </a:prstGeom>
+          <a:solidFill>
+            <a:schemeClr val="accent2"/>
+          </a:solidFill>
+          <a:ln>
+            <a:noFill/>
+          </a:ln>
         </p:spPr>
         <p:style>
           <a:lnRef idx="2">
@@ -7178,7 +7414,7 @@
           <a:lstStyle/>
           <a:p>
             <a:pPr algn="ctr"/>
-            <a:endParaRPr lang="en-AU" dirty="0">
+            <a:endParaRPr lang="en-AU">
               <a:solidFill>
                 <a:schemeClr val="tx1"/>
               </a:solidFill>
@@ -7188,62 +7424,30 @@
       </p:sp>
       <p:sp>
         <p:nvSpPr>
-          <p:cNvPr id="20" name="TextBox 19">
-            <a:extLst>
-              <a:ext uri="{FF2B5EF4-FFF2-40B4-BE49-F238E27FC236}">
-                <a16:creationId xmlns:a16="http://schemas.microsoft.com/office/drawing/2014/main" id="{89E4B215-6A80-4FA2-9656-D17B7FDB9874}"/>
-              </a:ext>
-            </a:extLst>
-          </p:cNvPr>
-          <p:cNvSpPr txBox="1"/>
+          <p:cNvPr id="23" name="Arrow: U-Turn 22">
+            <a:extLst>
+              <a:ext uri="{FF2B5EF4-FFF2-40B4-BE49-F238E27FC236}">
+                <a16:creationId xmlns:a16="http://schemas.microsoft.com/office/drawing/2014/main" id="{BFDF283E-F624-4516-A9BE-160867AF1F37}"/>
+              </a:ext>
+            </a:extLst>
+          </p:cNvPr>
+          <p:cNvSpPr/>
           <p:nvPr/>
         </p:nvSpPr>
         <p:spPr>
           <a:xfrm>
-            <a:off x="5304631" y="2638423"/>
-            <a:ext cx="1582737" cy="646331"/>
-          </a:xfrm>
-          <a:prstGeom prst="rect">
-            <a:avLst/>
-          </a:prstGeom>
-          <a:noFill/>
-        </p:spPr>
-        <p:txBody>
-          <a:bodyPr wrap="square" rtlCol="0">
-            <a:spAutoFit/>
-          </a:bodyPr>
-          <a:lstStyle/>
-          <a:p>
-            <a:r>
-              <a:rPr lang="en-AU" dirty="0"/>
-              <a:t>4 buckets</a:t>
-            </a:r>
-          </a:p>
-          <a:p>
-            <a:endParaRPr lang="en-AU" dirty="0"/>
-          </a:p>
-        </p:txBody>
-      </p:sp>
-      <p:sp>
-        <p:nvSpPr>
-          <p:cNvPr id="22" name="Arrow: U-Turn 21">
-            <a:extLst>
-              <a:ext uri="{FF2B5EF4-FFF2-40B4-BE49-F238E27FC236}">
-                <a16:creationId xmlns:a16="http://schemas.microsoft.com/office/drawing/2014/main" id="{3DEFA7E2-DB0C-43C0-8078-E4F04CD785D5}"/>
-              </a:ext>
-            </a:extLst>
-          </p:cNvPr>
-          <p:cNvSpPr/>
-          <p:nvPr/>
-        </p:nvSpPr>
-        <p:spPr>
-          <a:xfrm>
-            <a:off x="4500562" y="3095625"/>
-            <a:ext cx="1595438" cy="532716"/>
+            <a:off x="4704080" y="2571190"/>
+            <a:ext cx="5537200" cy="532716"/>
           </a:xfrm>
           <a:prstGeom prst="uturnArrow">
             <a:avLst/>
           </a:prstGeom>
+          <a:solidFill>
+            <a:schemeClr val="accent2"/>
+          </a:solidFill>
+          <a:ln>
+            <a:noFill/>
+          </a:ln>
         </p:spPr>
         <p:style>
           <a:lnRef idx="2">
@@ -7276,10 +7480,10 @@
       </p:sp>
       <p:sp>
         <p:nvSpPr>
-          <p:cNvPr id="23" name="Arrow: U-Turn 22">
-            <a:extLst>
-              <a:ext uri="{FF2B5EF4-FFF2-40B4-BE49-F238E27FC236}">
-                <a16:creationId xmlns:a16="http://schemas.microsoft.com/office/drawing/2014/main" id="{BFDF283E-F624-4516-A9BE-160867AF1F37}"/>
+          <p:cNvPr id="24" name="Arrow: U-Turn 23">
+            <a:extLst>
+              <a:ext uri="{FF2B5EF4-FFF2-40B4-BE49-F238E27FC236}">
+                <a16:creationId xmlns:a16="http://schemas.microsoft.com/office/drawing/2014/main" id="{C0196BFC-A169-4EA2-8F6A-7E6440E9B999}"/>
               </a:ext>
             </a:extLst>
           </p:cNvPr>
@@ -7288,12 +7492,18 @@
         </p:nvSpPr>
         <p:spPr>
           <a:xfrm>
-            <a:off x="4500562" y="3095625"/>
-            <a:ext cx="5157788" cy="532716"/>
+            <a:off x="4704080" y="2571189"/>
+            <a:ext cx="6609080" cy="532716"/>
           </a:xfrm>
           <a:prstGeom prst="uturnArrow">
             <a:avLst/>
           </a:prstGeom>
+          <a:solidFill>
+            <a:schemeClr val="accent2"/>
+          </a:solidFill>
+          <a:ln>
+            <a:noFill/>
+          </a:ln>
         </p:spPr>
         <p:style>
           <a:lnRef idx="2">
@@ -7326,10 +7536,48 @@
       </p:sp>
       <p:sp>
         <p:nvSpPr>
-          <p:cNvPr id="24" name="Arrow: U-Turn 23">
-            <a:extLst>
-              <a:ext uri="{FF2B5EF4-FFF2-40B4-BE49-F238E27FC236}">
-                <a16:creationId xmlns:a16="http://schemas.microsoft.com/office/drawing/2014/main" id="{C0196BFC-A169-4EA2-8F6A-7E6440E9B999}"/>
+          <p:cNvPr id="11" name="TextBox 10">
+            <a:extLst>
+              <a:ext uri="{FF2B5EF4-FFF2-40B4-BE49-F238E27FC236}">
+                <a16:creationId xmlns:a16="http://schemas.microsoft.com/office/drawing/2014/main" id="{25722446-E465-463A-BA49-461B0DFCF434}"/>
+              </a:ext>
+            </a:extLst>
+          </p:cNvPr>
+          <p:cNvSpPr txBox="1"/>
+          <p:nvPr/>
+        </p:nvSpPr>
+        <p:spPr>
+          <a:xfrm>
+            <a:off x="1152526" y="5032628"/>
+            <a:ext cx="2471737" cy="369332"/>
+          </a:xfrm>
+          <a:prstGeom prst="rect">
+            <a:avLst/>
+          </a:prstGeom>
+          <a:noFill/>
+        </p:spPr>
+        <p:txBody>
+          <a:bodyPr wrap="square" rtlCol="0">
+            <a:spAutoFit/>
+          </a:bodyPr>
+          <a:lstStyle/>
+          <a:p>
+            <a:r>
+              <a:rPr lang="en-AU" dirty="0">
+                <a:latin typeface="Roboto Light" panose="02000000000000000000" pitchFamily="2" charset="0"/>
+                <a:ea typeface="Roboto Light" panose="02000000000000000000" pitchFamily="2" charset="0"/>
+              </a:rPr>
+              <a:t>Time period slice</a:t>
+            </a:r>
+          </a:p>
+        </p:txBody>
+      </p:sp>
+      <p:sp>
+        <p:nvSpPr>
+          <p:cNvPr id="12" name="Arrow: U-Turn 11">
+            <a:extLst>
+              <a:ext uri="{FF2B5EF4-FFF2-40B4-BE49-F238E27FC236}">
+                <a16:creationId xmlns:a16="http://schemas.microsoft.com/office/drawing/2014/main" id="{520ECA5C-7088-4C2E-A815-57411C50E79C}"/>
               </a:ext>
             </a:extLst>
           </p:cNvPr>
@@ -7338,12 +7586,18 @@
         </p:nvSpPr>
         <p:spPr>
           <a:xfrm>
-            <a:off x="4500562" y="3095624"/>
-            <a:ext cx="6186488" cy="532716"/>
+            <a:off x="4704080" y="2571188"/>
+            <a:ext cx="2992120" cy="522506"/>
           </a:xfrm>
           <a:prstGeom prst="uturnArrow">
             <a:avLst/>
           </a:prstGeom>
+          <a:solidFill>
+            <a:schemeClr val="accent2"/>
+          </a:solidFill>
+          <a:ln>
+            <a:noFill/>
+          </a:ln>
         </p:spPr>
         <p:style>
           <a:lnRef idx="2">
@@ -7376,10 +7630,10 @@
       </p:sp>
       <p:sp>
         <p:nvSpPr>
-          <p:cNvPr id="11" name="TextBox 10">
-            <a:extLst>
-              <a:ext uri="{FF2B5EF4-FFF2-40B4-BE49-F238E27FC236}">
-                <a16:creationId xmlns:a16="http://schemas.microsoft.com/office/drawing/2014/main" id="{25722446-E465-463A-BA49-461B0DFCF434}"/>
+          <p:cNvPr id="13" name="TextBox 12">
+            <a:extLst>
+              <a:ext uri="{FF2B5EF4-FFF2-40B4-BE49-F238E27FC236}">
+                <a16:creationId xmlns:a16="http://schemas.microsoft.com/office/drawing/2014/main" id="{715C1833-F3A8-44CF-9287-3F9955BB51D6}"/>
               </a:ext>
             </a:extLst>
           </p:cNvPr>
@@ -7388,98 +7642,16 @@
         </p:nvSpPr>
         <p:spPr>
           <a:xfrm>
-            <a:off x="1152526" y="5557063"/>
-            <a:ext cx="2471737" cy="369332"/>
-          </a:xfrm>
-          <a:prstGeom prst="rect">
-            <a:avLst/>
-          </a:prstGeom>
-          <a:noFill/>
-        </p:spPr>
-        <p:txBody>
-          <a:bodyPr wrap="square" rtlCol="0">
-            <a:spAutoFit/>
-          </a:bodyPr>
-          <a:lstStyle/>
-          <a:p>
-            <a:r>
-              <a:rPr lang="en-AU" dirty="0"/>
-              <a:t>Time period slice</a:t>
-            </a:r>
-          </a:p>
-        </p:txBody>
-      </p:sp>
-      <p:sp>
-        <p:nvSpPr>
-          <p:cNvPr id="12" name="Arrow: U-Turn 11">
-            <a:extLst>
-              <a:ext uri="{FF2B5EF4-FFF2-40B4-BE49-F238E27FC236}">
-                <a16:creationId xmlns:a16="http://schemas.microsoft.com/office/drawing/2014/main" id="{520ECA5C-7088-4C2E-A815-57411C50E79C}"/>
-              </a:ext>
-            </a:extLst>
-          </p:cNvPr>
-          <p:cNvSpPr/>
-          <p:nvPr/>
-        </p:nvSpPr>
-        <p:spPr>
-          <a:xfrm>
-            <a:off x="4500562" y="3085413"/>
-            <a:ext cx="2662238" cy="532716"/>
-          </a:xfrm>
-          <a:prstGeom prst="uturnArrow">
-            <a:avLst/>
-          </a:prstGeom>
-        </p:spPr>
-        <p:style>
-          <a:lnRef idx="2">
-            <a:schemeClr val="accent1">
-              <a:shade val="50000"/>
-            </a:schemeClr>
-          </a:lnRef>
-          <a:fillRef idx="1">
-            <a:schemeClr val="accent1"/>
-          </a:fillRef>
-          <a:effectRef idx="0">
-            <a:schemeClr val="accent1"/>
-          </a:effectRef>
-          <a:fontRef idx="minor">
-            <a:schemeClr val="lt1"/>
-          </a:fontRef>
-        </p:style>
-        <p:txBody>
-          <a:bodyPr rtlCol="0" anchor="ctr"/>
-          <a:lstStyle/>
-          <a:p>
-            <a:pPr algn="ctr"/>
-            <a:endParaRPr lang="en-AU">
-              <a:solidFill>
-                <a:schemeClr val="tx1"/>
-              </a:solidFill>
-            </a:endParaRPr>
-          </a:p>
-        </p:txBody>
-      </p:sp>
-      <p:sp>
-        <p:nvSpPr>
-          <p:cNvPr id="13" name="TextBox 12">
-            <a:extLst>
-              <a:ext uri="{FF2B5EF4-FFF2-40B4-BE49-F238E27FC236}">
-                <a16:creationId xmlns:a16="http://schemas.microsoft.com/office/drawing/2014/main" id="{715C1833-F3A8-44CF-9287-3F9955BB51D6}"/>
-              </a:ext>
-            </a:extLst>
-          </p:cNvPr>
-          <p:cNvSpPr txBox="1"/>
-          <p:nvPr/>
-        </p:nvSpPr>
-        <p:spPr>
-          <a:xfrm>
-            <a:off x="6610350" y="2428441"/>
+            <a:off x="6748182" y="1821689"/>
             <a:ext cx="3048000" cy="923330"/>
           </a:xfrm>
           <a:prstGeom prst="rect">
             <a:avLst/>
           </a:prstGeom>
           <a:noFill/>
+          <a:ln>
+            <a:noFill/>
+          </a:ln>
         </p:spPr>
         <p:txBody>
           <a:bodyPr wrap="square" rtlCol="0">
@@ -7488,8 +7660,25 @@
           <a:lstStyle/>
           <a:p>
             <a:r>
-              <a:rPr lang="en-AU" dirty="0"/>
-              <a:t>Class imbalance, evidence of parametric fit</a:t>
+              <a:rPr lang="en-AU" dirty="0">
+                <a:latin typeface="Roboto Light" panose="02000000000000000000" pitchFamily="2" charset="0"/>
+                <a:ea typeface="Roboto Light" panose="02000000000000000000" pitchFamily="2" charset="0"/>
+              </a:rPr>
+              <a:t>Class imbalance, evidence of parametric fit </a:t>
+            </a:r>
+            <a:r>
+              <a:rPr lang="en-AU" dirty="0" err="1">
+                <a:latin typeface="Roboto Light" panose="02000000000000000000" pitchFamily="2" charset="0"/>
+                <a:ea typeface="Roboto Light" panose="02000000000000000000" pitchFamily="2" charset="0"/>
+              </a:rPr>
+              <a:t>ect</a:t>
+            </a:r>
+            <a:r>
+              <a:rPr lang="en-AU" dirty="0">
+                <a:latin typeface="Roboto Light" panose="02000000000000000000" pitchFamily="2" charset="0"/>
+                <a:ea typeface="Roboto Light" panose="02000000000000000000" pitchFamily="2" charset="0"/>
+              </a:rPr>
+              <a:t>.</a:t>
             </a:r>
           </a:p>
           <a:p>
@@ -7501,6 +7690,72 @@
     <p:extLst>
       <p:ext uri="{BB962C8B-B14F-4D97-AF65-F5344CB8AC3E}">
         <p14:creationId xmlns:p14="http://schemas.microsoft.com/office/powerpoint/2010/main" val="2791687609"/>
+      </p:ext>
+    </p:extLst>
+  </p:cSld>
+  <p:clrMapOvr>
+    <a:masterClrMapping/>
+  </p:clrMapOvr>
+</p:sld>
+</file>
+
+<file path=ppt/slides/slide18.xml><?xml version="1.0" encoding="utf-8"?>
+<p:sld xmlns:a="http://schemas.openxmlformats.org/drawingml/2006/main" xmlns:r="http://schemas.openxmlformats.org/officeDocument/2006/relationships" xmlns:p="http://schemas.openxmlformats.org/presentationml/2006/main">
+  <p:cSld>
+    <p:spTree>
+      <p:nvGrpSpPr>
+        <p:cNvPr id="1" name=""/>
+        <p:cNvGrpSpPr/>
+        <p:nvPr/>
+      </p:nvGrpSpPr>
+      <p:grpSpPr>
+        <a:xfrm>
+          <a:off x="0" y="0"/>
+          <a:ext cx="0" cy="0"/>
+          <a:chOff x="0" y="0"/>
+          <a:chExt cx="0" cy="0"/>
+        </a:xfrm>
+      </p:grpSpPr>
+      <p:sp>
+        <p:nvSpPr>
+          <p:cNvPr id="4" name="Title 1">
+            <a:extLst>
+              <a:ext uri="{FF2B5EF4-FFF2-40B4-BE49-F238E27FC236}">
+                <a16:creationId xmlns:a16="http://schemas.microsoft.com/office/drawing/2014/main" id="{7B153C2D-7004-4D75-A94D-03B87103468E}"/>
+              </a:ext>
+            </a:extLst>
+          </p:cNvPr>
+          <p:cNvSpPr>
+            <a:spLocks noGrp="1"/>
+          </p:cNvSpPr>
+          <p:nvPr>
+            <p:ph type="title"/>
+          </p:nvPr>
+        </p:nvSpPr>
+        <p:spPr>
+          <a:xfrm>
+            <a:off x="4437529" y="2766218"/>
+            <a:ext cx="3724835" cy="1325563"/>
+          </a:xfrm>
+        </p:spPr>
+        <p:txBody>
+          <a:bodyPr/>
+          <a:lstStyle/>
+          <a:p>
+            <a:r>
+              <a:rPr lang="en-AU" b="1" dirty="0">
+                <a:latin typeface="Roboto" panose="02000000000000000000" pitchFamily="2" charset="0"/>
+                <a:ea typeface="Roboto" panose="02000000000000000000" pitchFamily="2" charset="0"/>
+              </a:rPr>
+              <a:t>THANK YOU</a:t>
+            </a:r>
+          </a:p>
+        </p:txBody>
+      </p:sp>
+    </p:spTree>
+    <p:extLst>
+      <p:ext uri="{BB962C8B-B14F-4D97-AF65-F5344CB8AC3E}">
+        <p14:creationId xmlns:p14="http://schemas.microsoft.com/office/powerpoint/2010/main" val="4262394880"/>
       </p:ext>
     </p:extLst>
   </p:cSld>
@@ -7549,7 +7804,7 @@
           <a:lstStyle/>
           <a:p>
             <a:r>
-              <a:rPr lang="en-AU" dirty="0">
+              <a:rPr lang="en-AU" b="1" dirty="0">
                 <a:latin typeface="Roboto" panose="02000000000000000000" pitchFamily="2" charset="0"/>
                 <a:ea typeface="Roboto" panose="02000000000000000000" pitchFamily="2" charset="0"/>
               </a:rPr>
@@ -7736,7 +7991,7 @@
           <a:lstStyle/>
           <a:p>
             <a:r>
-              <a:rPr lang="en-AU" dirty="0">
+              <a:rPr lang="en-AU" b="1" dirty="0">
                 <a:latin typeface="Roboto" panose="02000000000000000000" pitchFamily="2" charset="0"/>
                 <a:ea typeface="Roboto" panose="02000000000000000000" pitchFamily="2" charset="0"/>
               </a:rPr>
@@ -8061,7 +8316,7 @@
           <a:lstStyle/>
           <a:p>
             <a:r>
-              <a:rPr lang="en-AU" dirty="0">
+              <a:rPr lang="en-AU" b="1" dirty="0">
                 <a:latin typeface="Roboto" panose="02000000000000000000" pitchFamily="2" charset="0"/>
                 <a:ea typeface="Roboto" panose="02000000000000000000" pitchFamily="2" charset="0"/>
               </a:rPr>
@@ -8239,7 +8494,7 @@
           <a:lstStyle/>
           <a:p>
             <a:r>
-              <a:rPr lang="en-AU" dirty="0">
+              <a:rPr lang="en-AU" b="1" dirty="0">
                 <a:latin typeface="Roboto" panose="02000000000000000000" pitchFamily="2" charset="0"/>
                 <a:ea typeface="Roboto" panose="02000000000000000000" pitchFamily="2" charset="0"/>
               </a:rPr>
@@ -8373,7 +8628,7 @@
           <a:lstStyle/>
           <a:p>
             <a:r>
-              <a:rPr lang="en-AU" dirty="0">
+              <a:rPr lang="en-AU" b="1" dirty="0">
                 <a:latin typeface="Roboto" panose="02000000000000000000" pitchFamily="2" charset="0"/>
                 <a:ea typeface="Roboto" panose="02000000000000000000" pitchFamily="2" charset="0"/>
               </a:rPr>
@@ -8537,13 +8792,13 @@
           <a:lstStyle/>
           <a:p>
             <a:r>
-              <a:rPr lang="en-AU" dirty="0">
+              <a:rPr lang="en-AU" b="1" dirty="0">
                 <a:latin typeface="Roboto" panose="02000000000000000000" pitchFamily="2" charset="0"/>
                 <a:ea typeface="Roboto" panose="02000000000000000000" pitchFamily="2" charset="0"/>
               </a:rPr>
               <a:t>The 1-liner statement</a:t>
             </a:r>
-            <a:endParaRPr lang="en-AU" dirty="0"/>
+            <a:endParaRPr lang="en-AU" b="1" dirty="0"/>
           </a:p>
         </p:txBody>
       </p:sp>
@@ -9043,7 +9298,7 @@
           <a:lstStyle/>
           <a:p>
             <a:r>
-              <a:rPr lang="en-AU" dirty="0">
+              <a:rPr lang="en-AU" b="1" dirty="0">
                 <a:latin typeface="Roboto" panose="02000000000000000000" pitchFamily="2" charset="0"/>
                 <a:ea typeface="Roboto" panose="02000000000000000000" pitchFamily="2" charset="0"/>
               </a:rPr>
@@ -9681,7 +9936,7 @@
           <a:lstStyle/>
           <a:p>
             <a:r>
-              <a:rPr lang="en-AU" dirty="0">
+              <a:rPr lang="en-AU" b="1" dirty="0">
                 <a:latin typeface="Roboto" panose="02000000000000000000" pitchFamily="2" charset="0"/>
                 <a:ea typeface="Roboto" panose="02000000000000000000" pitchFamily="2" charset="0"/>
               </a:rPr>

</xml_diff>

<commit_message>
changed comments on results in notebook
</commit_message>
<xml_diff>
--- a/Problem Formulation & EDA.pptx
+++ b/Problem Formulation & EDA.pptx
@@ -137,12 +137,12 @@
   <pc:docChgLst>
     <pc:chgData name="Jonathan Tan" userId="857367a7-879e-4e19-86ac-1880d4642e3c" providerId="ADAL" clId="{4F4A7EE7-ED1A-4BB8-B90A-17AB4A4179EB}"/>
     <pc:docChg chg="undo custSel addSld delSld modSld">
-      <pc:chgData name="Jonathan Tan" userId="857367a7-879e-4e19-86ac-1880d4642e3c" providerId="ADAL" clId="{4F4A7EE7-ED1A-4BB8-B90A-17AB4A4179EB}" dt="2021-08-11T10:58:33.875" v="4561" actId="1076"/>
+      <pc:chgData name="Jonathan Tan" userId="857367a7-879e-4e19-86ac-1880d4642e3c" providerId="ADAL" clId="{4F4A7EE7-ED1A-4BB8-B90A-17AB4A4179EB}" dt="2021-08-11T23:24:33.376" v="4589" actId="20577"/>
       <pc:docMkLst>
         <pc:docMk/>
       </pc:docMkLst>
       <pc:sldChg chg="addSp modSp mod">
-        <pc:chgData name="Jonathan Tan" userId="857367a7-879e-4e19-86ac-1880d4642e3c" providerId="ADAL" clId="{4F4A7EE7-ED1A-4BB8-B90A-17AB4A4179EB}" dt="2021-08-11T02:38:16.915" v="88" actId="20577"/>
+        <pc:chgData name="Jonathan Tan" userId="857367a7-879e-4e19-86ac-1880d4642e3c" providerId="ADAL" clId="{4F4A7EE7-ED1A-4BB8-B90A-17AB4A4179EB}" dt="2021-08-11T23:22:00.791" v="4588" actId="20577"/>
         <pc:sldMkLst>
           <pc:docMk/>
           <pc:sldMk cId="1638485863" sldId="256"/>
@@ -156,7 +156,7 @@
           </ac:spMkLst>
         </pc:spChg>
         <pc:spChg chg="add mod">
-          <ac:chgData name="Jonathan Tan" userId="857367a7-879e-4e19-86ac-1880d4642e3c" providerId="ADAL" clId="{4F4A7EE7-ED1A-4BB8-B90A-17AB4A4179EB}" dt="2021-08-11T02:38:16.915" v="88" actId="20577"/>
+          <ac:chgData name="Jonathan Tan" userId="857367a7-879e-4e19-86ac-1880d4642e3c" providerId="ADAL" clId="{4F4A7EE7-ED1A-4BB8-B90A-17AB4A4179EB}" dt="2021-08-11T23:22:00.791" v="4588" actId="20577"/>
           <ac:spMkLst>
             <pc:docMk/>
             <pc:sldMk cId="1638485863" sldId="256"/>
@@ -460,7 +460,7 @@
         </pc:spChg>
       </pc:sldChg>
       <pc:sldChg chg="addSp delSp modSp add mod modNotesTx">
-        <pc:chgData name="Jonathan Tan" userId="857367a7-879e-4e19-86ac-1880d4642e3c" providerId="ADAL" clId="{4F4A7EE7-ED1A-4BB8-B90A-17AB4A4179EB}" dt="2021-08-11T03:34:27.766" v="1075" actId="20577"/>
+        <pc:chgData name="Jonathan Tan" userId="857367a7-879e-4e19-86ac-1880d4642e3c" providerId="ADAL" clId="{4F4A7EE7-ED1A-4BB8-B90A-17AB4A4179EB}" dt="2021-08-11T23:24:33.376" v="4589" actId="20577"/>
         <pc:sldMkLst>
           <pc:docMk/>
           <pc:sldMk cId="1463269499" sldId="272"/>
@@ -795,7 +795,7 @@
           <a:p>
             <a:fld id="{1107AAAD-A763-4B86-A2B7-07FBDE9BAB75}" type="datetimeFigureOut">
               <a:rPr lang="en-AU" smtClean="0"/>
-              <a:t>11/08/2021</a:t>
+              <a:t>12/08/2021</a:t>
             </a:fld>
             <a:endParaRPr lang="en-AU"/>
           </a:p>
@@ -1362,6 +1362,90 @@
 </p:notes>
 </file>
 
+<file path=ppt/notesSlides/notesSlide12.xml><?xml version="1.0" encoding="utf-8"?>
+<p:notes xmlns:a="http://schemas.openxmlformats.org/drawingml/2006/main" xmlns:r="http://schemas.openxmlformats.org/officeDocument/2006/relationships" xmlns:p="http://schemas.openxmlformats.org/presentationml/2006/main">
+  <p:cSld>
+    <p:spTree>
+      <p:nvGrpSpPr>
+        <p:cNvPr id="1" name=""/>
+        <p:cNvGrpSpPr/>
+        <p:nvPr/>
+      </p:nvGrpSpPr>
+      <p:grpSpPr>
+        <a:xfrm>
+          <a:off x="0" y="0"/>
+          <a:ext cx="0" cy="0"/>
+          <a:chOff x="0" y="0"/>
+          <a:chExt cx="0" cy="0"/>
+        </a:xfrm>
+      </p:grpSpPr>
+      <p:sp>
+        <p:nvSpPr>
+          <p:cNvPr id="2" name="Slide Image Placeholder 1"/>
+          <p:cNvSpPr>
+            <a:spLocks noGrp="1" noRot="1" noChangeAspect="1"/>
+          </p:cNvSpPr>
+          <p:nvPr>
+            <p:ph type="sldImg"/>
+          </p:nvPr>
+        </p:nvSpPr>
+        <p:spPr/>
+      </p:sp>
+      <p:sp>
+        <p:nvSpPr>
+          <p:cNvPr id="3" name="Notes Placeholder 2"/>
+          <p:cNvSpPr>
+            <a:spLocks noGrp="1"/>
+          </p:cNvSpPr>
+          <p:nvPr>
+            <p:ph type="body" idx="1"/>
+          </p:nvPr>
+        </p:nvSpPr>
+        <p:spPr/>
+        <p:txBody>
+          <a:bodyPr/>
+          <a:lstStyle/>
+          <a:p>
+            <a:endParaRPr lang="en-AU" dirty="0"/>
+          </a:p>
+        </p:txBody>
+      </p:sp>
+      <p:sp>
+        <p:nvSpPr>
+          <p:cNvPr id="4" name="Slide Number Placeholder 3"/>
+          <p:cNvSpPr>
+            <a:spLocks noGrp="1"/>
+          </p:cNvSpPr>
+          <p:nvPr>
+            <p:ph type="sldNum" sz="quarter" idx="5"/>
+          </p:nvPr>
+        </p:nvSpPr>
+        <p:spPr/>
+        <p:txBody>
+          <a:bodyPr/>
+          <a:lstStyle/>
+          <a:p>
+            <a:fld id="{75394A9C-DD77-468F-899D-B535CEE43AF3}" type="slidenum">
+              <a:rPr lang="en-AU" smtClean="0"/>
+              <a:t>17</a:t>
+            </a:fld>
+            <a:endParaRPr lang="en-AU"/>
+          </a:p>
+        </p:txBody>
+      </p:sp>
+    </p:spTree>
+    <p:extLst>
+      <p:ext uri="{BB962C8B-B14F-4D97-AF65-F5344CB8AC3E}">
+        <p14:creationId xmlns:p14="http://schemas.microsoft.com/office/powerpoint/2010/main" val="696566368"/>
+      </p:ext>
+    </p:extLst>
+  </p:cSld>
+  <p:clrMapOvr>
+    <a:masterClrMapping/>
+  </p:clrMapOvr>
+</p:notes>
+</file>
+
 <file path=ppt/notesSlides/notesSlide2.xml><?xml version="1.0" encoding="utf-8"?>
 <p:notes xmlns:a="http://schemas.openxmlformats.org/drawingml/2006/main" xmlns:r="http://schemas.openxmlformats.org/officeDocument/2006/relationships" xmlns:p="http://schemas.openxmlformats.org/presentationml/2006/main">
   <p:cSld>
@@ -2054,10 +2138,7 @@
           <a:bodyPr/>
           <a:lstStyle/>
           <a:p>
-            <a:r>
-              <a:rPr lang="en-AU" dirty="0"/>
-              <a:t>Say our project involves</a:t>
-            </a:r>
+            <a:endParaRPr lang="en-AU" dirty="0"/>
           </a:p>
         </p:txBody>
       </p:sp>
@@ -2501,9 +2582,9 @@
           <a:bodyPr/>
           <a:lstStyle/>
           <a:p>
-            <a:fld id="{88AE2C35-0D28-4825-98D7-B391AF6BD3F5}" type="datetimeFigureOut">
+            <a:fld id="{7FE27A7D-A964-4B1F-B091-8783BFC92FF0}" type="datetime1">
               <a:rPr lang="en-AU" smtClean="0"/>
-              <a:t>11/08/2021</a:t>
+              <a:t>12/08/2021</a:t>
             </a:fld>
             <a:endParaRPr lang="en-AU"/>
           </a:p>
@@ -2701,9 +2782,9 @@
           <a:bodyPr/>
           <a:lstStyle/>
           <a:p>
-            <a:fld id="{88AE2C35-0D28-4825-98D7-B391AF6BD3F5}" type="datetimeFigureOut">
+            <a:fld id="{BCC32B46-6662-412B-A6F9-A0318CF2EE2A}" type="datetime1">
               <a:rPr lang="en-AU" smtClean="0"/>
-              <a:t>11/08/2021</a:t>
+              <a:t>12/08/2021</a:t>
             </a:fld>
             <a:endParaRPr lang="en-AU"/>
           </a:p>
@@ -2911,9 +2992,9 @@
           <a:bodyPr/>
           <a:lstStyle/>
           <a:p>
-            <a:fld id="{88AE2C35-0D28-4825-98D7-B391AF6BD3F5}" type="datetimeFigureOut">
+            <a:fld id="{482E960B-3666-4515-A355-E60E28AB6BA2}" type="datetime1">
               <a:rPr lang="en-AU" smtClean="0"/>
-              <a:t>11/08/2021</a:t>
+              <a:t>12/08/2021</a:t>
             </a:fld>
             <a:endParaRPr lang="en-AU"/>
           </a:p>
@@ -3111,9 +3192,9 @@
           <a:bodyPr/>
           <a:lstStyle/>
           <a:p>
-            <a:fld id="{88AE2C35-0D28-4825-98D7-B391AF6BD3F5}" type="datetimeFigureOut">
+            <a:fld id="{11B12828-331B-4B3B-8EA7-6701FF3132C1}" type="datetime1">
               <a:rPr lang="en-AU" smtClean="0"/>
-              <a:t>11/08/2021</a:t>
+              <a:t>12/08/2021</a:t>
             </a:fld>
             <a:endParaRPr lang="en-AU"/>
           </a:p>
@@ -3387,9 +3468,9 @@
           <a:bodyPr/>
           <a:lstStyle/>
           <a:p>
-            <a:fld id="{88AE2C35-0D28-4825-98D7-B391AF6BD3F5}" type="datetimeFigureOut">
+            <a:fld id="{DE89A2D8-4B8B-46A7-9E17-9A8F51870EEE}" type="datetime1">
               <a:rPr lang="en-AU" smtClean="0"/>
-              <a:t>11/08/2021</a:t>
+              <a:t>12/08/2021</a:t>
             </a:fld>
             <a:endParaRPr lang="en-AU"/>
           </a:p>
@@ -3655,9 +3736,9 @@
           <a:bodyPr/>
           <a:lstStyle/>
           <a:p>
-            <a:fld id="{88AE2C35-0D28-4825-98D7-B391AF6BD3F5}" type="datetimeFigureOut">
+            <a:fld id="{5132BBBF-DEA2-4622-8115-FAA6F079980F}" type="datetime1">
               <a:rPr lang="en-AU" smtClean="0"/>
-              <a:t>11/08/2021</a:t>
+              <a:t>12/08/2021</a:t>
             </a:fld>
             <a:endParaRPr lang="en-AU"/>
           </a:p>
@@ -4070,9 +4151,9 @@
           <a:bodyPr/>
           <a:lstStyle/>
           <a:p>
-            <a:fld id="{88AE2C35-0D28-4825-98D7-B391AF6BD3F5}" type="datetimeFigureOut">
+            <a:fld id="{4D2E7482-14B5-4703-A459-E727B39F7B34}" type="datetime1">
               <a:rPr lang="en-AU" smtClean="0"/>
-              <a:t>11/08/2021</a:t>
+              <a:t>12/08/2021</a:t>
             </a:fld>
             <a:endParaRPr lang="en-AU"/>
           </a:p>
@@ -4212,9 +4293,9 @@
           <a:bodyPr/>
           <a:lstStyle/>
           <a:p>
-            <a:fld id="{88AE2C35-0D28-4825-98D7-B391AF6BD3F5}" type="datetimeFigureOut">
+            <a:fld id="{FE92669D-8D9E-4D18-BC9F-D56130BD8790}" type="datetime1">
               <a:rPr lang="en-AU" smtClean="0"/>
-              <a:t>11/08/2021</a:t>
+              <a:t>12/08/2021</a:t>
             </a:fld>
             <a:endParaRPr lang="en-AU"/>
           </a:p>
@@ -4325,9 +4406,9 @@
           <a:bodyPr/>
           <a:lstStyle/>
           <a:p>
-            <a:fld id="{88AE2C35-0D28-4825-98D7-B391AF6BD3F5}" type="datetimeFigureOut">
+            <a:fld id="{4EE65601-B9B3-478B-9B95-97242888A7A3}" type="datetime1">
               <a:rPr lang="en-AU" smtClean="0"/>
-              <a:t>11/08/2021</a:t>
+              <a:t>12/08/2021</a:t>
             </a:fld>
             <a:endParaRPr lang="en-AU"/>
           </a:p>
@@ -4638,9 +4719,9 @@
           <a:bodyPr/>
           <a:lstStyle/>
           <a:p>
-            <a:fld id="{88AE2C35-0D28-4825-98D7-B391AF6BD3F5}" type="datetimeFigureOut">
+            <a:fld id="{8ED63CB8-A4CD-4432-9291-07EFC2CDFE99}" type="datetime1">
               <a:rPr lang="en-AU" smtClean="0"/>
-              <a:t>11/08/2021</a:t>
+              <a:t>12/08/2021</a:t>
             </a:fld>
             <a:endParaRPr lang="en-AU"/>
           </a:p>
@@ -4927,9 +5008,9 @@
           <a:bodyPr/>
           <a:lstStyle/>
           <a:p>
-            <a:fld id="{88AE2C35-0D28-4825-98D7-B391AF6BD3F5}" type="datetimeFigureOut">
+            <a:fld id="{59DAD402-678A-4D55-9DAC-0070122145E6}" type="datetime1">
               <a:rPr lang="en-AU" smtClean="0"/>
-              <a:t>11/08/2021</a:t>
+              <a:t>12/08/2021</a:t>
             </a:fld>
             <a:endParaRPr lang="en-AU"/>
           </a:p>
@@ -5170,9 +5251,9 @@
             </a:lvl1pPr>
           </a:lstStyle>
           <a:p>
-            <a:fld id="{88AE2C35-0D28-4825-98D7-B391AF6BD3F5}" type="datetimeFigureOut">
+            <a:fld id="{DA0D38F6-CD78-41B3-B262-F9E5406259FB}" type="datetime1">
               <a:rPr lang="en-AU" smtClean="0"/>
-              <a:t>11/08/2021</a:t>
+              <a:t>12/08/2021</a:t>
             </a:fld>
             <a:endParaRPr lang="en-AU"/>
           </a:p>
@@ -5289,6 +5370,7 @@
     <p:sldLayoutId id="2147483658" r:id="rId10"/>
     <p:sldLayoutId id="2147483659" r:id="rId11"/>
   </p:sldLayoutIdLst>
+  <p:hf hdr="0" ftr="0" dt="0"/>
   <p:txStyles>
     <p:titleStyle>
       <a:lvl1pPr algn="l" defTabSz="914400" rtl="0" eaLnBrk="1" latinLnBrk="0" hangingPunct="1">
@@ -5639,7 +5721,7 @@
         <p:spPr>
           <a:xfrm>
             <a:off x="2189747" y="3429000"/>
-            <a:ext cx="7483642" cy="598321"/>
+            <a:ext cx="7483642" cy="673100"/>
           </a:xfrm>
           <a:prstGeom prst="rect">
             <a:avLst/>
@@ -5670,12 +5752,54 @@
           </a:lstStyle>
           <a:p>
             <a:r>
-              <a:rPr lang="en-AU" sz="2800" b="1" dirty="0">
+              <a:rPr lang="en-AU" sz="2000" b="1" dirty="0">
                 <a:latin typeface="Roboto Light" panose="02000000000000000000" pitchFamily="2" charset="0"/>
                 <a:ea typeface="Roboto Light" panose="02000000000000000000" pitchFamily="2" charset="0"/>
               </a:rPr>
+              <a:t>Kernel Academy</a:t>
+            </a:r>
+            <a:br>
+              <a:rPr lang="en-AU" sz="2000" b="1" dirty="0">
+                <a:latin typeface="Roboto Light" panose="02000000000000000000" pitchFamily="2" charset="0"/>
+                <a:ea typeface="Roboto Light" panose="02000000000000000000" pitchFamily="2" charset="0"/>
+              </a:rPr>
+            </a:br>
+            <a:r>
+              <a:rPr lang="en-AU" sz="2000" b="1" dirty="0">
+                <a:latin typeface="Roboto Light" panose="02000000000000000000" pitchFamily="2" charset="0"/>
+                <a:ea typeface="Roboto Light" panose="02000000000000000000" pitchFamily="2" charset="0"/>
+              </a:rPr>
               <a:t>12/08/2021</a:t>
             </a:r>
+          </a:p>
+        </p:txBody>
+      </p:sp>
+      <p:sp>
+        <p:nvSpPr>
+          <p:cNvPr id="4" name="Slide Number Placeholder 3">
+            <a:extLst>
+              <a:ext uri="{FF2B5EF4-FFF2-40B4-BE49-F238E27FC236}">
+                <a16:creationId xmlns:a16="http://schemas.microsoft.com/office/drawing/2014/main" id="{03BC2BD7-B9B3-41EC-BE12-BFA849AC56C7}"/>
+              </a:ext>
+            </a:extLst>
+          </p:cNvPr>
+          <p:cNvSpPr>
+            <a:spLocks noGrp="1"/>
+          </p:cNvSpPr>
+          <p:nvPr>
+            <p:ph type="sldNum" sz="quarter" idx="12"/>
+          </p:nvPr>
+        </p:nvSpPr>
+        <p:spPr/>
+        <p:txBody>
+          <a:bodyPr/>
+          <a:lstStyle/>
+          <a:p>
+            <a:fld id="{46DDA321-FAA7-430B-9842-4C62AA7BAF3F}" type="slidenum">
+              <a:rPr lang="en-AU" smtClean="0"/>
+              <a:t>1</a:t>
+            </a:fld>
+            <a:endParaRPr lang="en-AU"/>
           </a:p>
         </p:txBody>
       </p:sp>
@@ -5876,6 +6000,35 @@
           </a:p>
         </p:txBody>
       </p:sp>
+      <p:sp>
+        <p:nvSpPr>
+          <p:cNvPr id="4" name="Slide Number Placeholder 3">
+            <a:extLst>
+              <a:ext uri="{FF2B5EF4-FFF2-40B4-BE49-F238E27FC236}">
+                <a16:creationId xmlns:a16="http://schemas.microsoft.com/office/drawing/2014/main" id="{FEBA242B-AF74-4DBA-A1DF-82B0C2D3D2A0}"/>
+              </a:ext>
+            </a:extLst>
+          </p:cNvPr>
+          <p:cNvSpPr>
+            <a:spLocks noGrp="1"/>
+          </p:cNvSpPr>
+          <p:nvPr>
+            <p:ph type="sldNum" sz="quarter" idx="12"/>
+          </p:nvPr>
+        </p:nvSpPr>
+        <p:spPr/>
+        <p:txBody>
+          <a:bodyPr/>
+          <a:lstStyle/>
+          <a:p>
+            <a:fld id="{46DDA321-FAA7-430B-9842-4C62AA7BAF3F}" type="slidenum">
+              <a:rPr lang="en-AU" smtClean="0"/>
+              <a:t>10</a:t>
+            </a:fld>
+            <a:endParaRPr lang="en-AU"/>
+          </a:p>
+        </p:txBody>
+      </p:sp>
     </p:spTree>
     <p:extLst>
       <p:ext uri="{BB962C8B-B14F-4D97-AF65-F5344CB8AC3E}">
@@ -6031,6 +6184,35 @@
               <a:latin typeface="Roboto Light" panose="02000000000000000000" pitchFamily="2" charset="0"/>
               <a:ea typeface="Roboto Light" panose="02000000000000000000" pitchFamily="2" charset="0"/>
             </a:endParaRPr>
+          </a:p>
+        </p:txBody>
+      </p:sp>
+      <p:sp>
+        <p:nvSpPr>
+          <p:cNvPr id="4" name="Slide Number Placeholder 3">
+            <a:extLst>
+              <a:ext uri="{FF2B5EF4-FFF2-40B4-BE49-F238E27FC236}">
+                <a16:creationId xmlns:a16="http://schemas.microsoft.com/office/drawing/2014/main" id="{0788E324-7980-4C88-8429-4F16CE09EF82}"/>
+              </a:ext>
+            </a:extLst>
+          </p:cNvPr>
+          <p:cNvSpPr>
+            <a:spLocks noGrp="1"/>
+          </p:cNvSpPr>
+          <p:nvPr>
+            <p:ph type="sldNum" sz="quarter" idx="12"/>
+          </p:nvPr>
+        </p:nvSpPr>
+        <p:spPr/>
+        <p:txBody>
+          <a:bodyPr/>
+          <a:lstStyle/>
+          <a:p>
+            <a:fld id="{46DDA321-FAA7-430B-9842-4C62AA7BAF3F}" type="slidenum">
+              <a:rPr lang="en-AU" smtClean="0"/>
+              <a:t>11</a:t>
+            </a:fld>
+            <a:endParaRPr lang="en-AU"/>
           </a:p>
         </p:txBody>
       </p:sp>
@@ -6347,6 +6529,35 @@
           </a:p>
         </p:txBody>
       </p:sp>
+      <p:sp>
+        <p:nvSpPr>
+          <p:cNvPr id="7" name="Slide Number Placeholder 6">
+            <a:extLst>
+              <a:ext uri="{FF2B5EF4-FFF2-40B4-BE49-F238E27FC236}">
+                <a16:creationId xmlns:a16="http://schemas.microsoft.com/office/drawing/2014/main" id="{416A4A52-0E35-4F21-B1EB-0E27D5FDCA82}"/>
+              </a:ext>
+            </a:extLst>
+          </p:cNvPr>
+          <p:cNvSpPr>
+            <a:spLocks noGrp="1"/>
+          </p:cNvSpPr>
+          <p:nvPr>
+            <p:ph type="sldNum" sz="quarter" idx="12"/>
+          </p:nvPr>
+        </p:nvSpPr>
+        <p:spPr/>
+        <p:txBody>
+          <a:bodyPr/>
+          <a:lstStyle/>
+          <a:p>
+            <a:fld id="{46DDA321-FAA7-430B-9842-4C62AA7BAF3F}" type="slidenum">
+              <a:rPr lang="en-AU" smtClean="0"/>
+              <a:t>12</a:t>
+            </a:fld>
+            <a:endParaRPr lang="en-AU"/>
+          </a:p>
+        </p:txBody>
+      </p:sp>
     </p:spTree>
     <p:extLst>
       <p:ext uri="{BB962C8B-B14F-4D97-AF65-F5344CB8AC3E}">
@@ -6552,6 +6763,35 @@
           </a:p>
         </p:txBody>
       </p:sp>
+      <p:sp>
+        <p:nvSpPr>
+          <p:cNvPr id="4" name="Slide Number Placeholder 3">
+            <a:extLst>
+              <a:ext uri="{FF2B5EF4-FFF2-40B4-BE49-F238E27FC236}">
+                <a16:creationId xmlns:a16="http://schemas.microsoft.com/office/drawing/2014/main" id="{02764E43-D580-4F9A-8B4C-C06D3B469810}"/>
+              </a:ext>
+            </a:extLst>
+          </p:cNvPr>
+          <p:cNvSpPr>
+            <a:spLocks noGrp="1"/>
+          </p:cNvSpPr>
+          <p:nvPr>
+            <p:ph type="sldNum" sz="quarter" idx="12"/>
+          </p:nvPr>
+        </p:nvSpPr>
+        <p:spPr/>
+        <p:txBody>
+          <a:bodyPr/>
+          <a:lstStyle/>
+          <a:p>
+            <a:fld id="{46DDA321-FAA7-430B-9842-4C62AA7BAF3F}" type="slidenum">
+              <a:rPr lang="en-AU" smtClean="0"/>
+              <a:t>13</a:t>
+            </a:fld>
+            <a:endParaRPr lang="en-AU"/>
+          </a:p>
+        </p:txBody>
+      </p:sp>
     </p:spTree>
     <p:extLst>
       <p:ext uri="{BB962C8B-B14F-4D97-AF65-F5344CB8AC3E}">
@@ -6807,6 +7047,35 @@
           </a:p>
         </p:txBody>
       </p:sp>
+      <p:sp>
+        <p:nvSpPr>
+          <p:cNvPr id="4" name="Slide Number Placeholder 3">
+            <a:extLst>
+              <a:ext uri="{FF2B5EF4-FFF2-40B4-BE49-F238E27FC236}">
+                <a16:creationId xmlns:a16="http://schemas.microsoft.com/office/drawing/2014/main" id="{0519CFB6-95D3-4D05-9750-6C839A482205}"/>
+              </a:ext>
+            </a:extLst>
+          </p:cNvPr>
+          <p:cNvSpPr>
+            <a:spLocks noGrp="1"/>
+          </p:cNvSpPr>
+          <p:nvPr>
+            <p:ph type="sldNum" sz="quarter" idx="12"/>
+          </p:nvPr>
+        </p:nvSpPr>
+        <p:spPr/>
+        <p:txBody>
+          <a:bodyPr/>
+          <a:lstStyle/>
+          <a:p>
+            <a:fld id="{46DDA321-FAA7-430B-9842-4C62AA7BAF3F}" type="slidenum">
+              <a:rPr lang="en-AU" smtClean="0"/>
+              <a:t>14</a:t>
+            </a:fld>
+            <a:endParaRPr lang="en-AU"/>
+          </a:p>
+        </p:txBody>
+      </p:sp>
     </p:spTree>
     <p:extLst>
       <p:ext uri="{BB962C8B-B14F-4D97-AF65-F5344CB8AC3E}">
@@ -6873,6 +7142,35 @@
           </a:p>
         </p:txBody>
       </p:sp>
+      <p:sp>
+        <p:nvSpPr>
+          <p:cNvPr id="3" name="Slide Number Placeholder 2">
+            <a:extLst>
+              <a:ext uri="{FF2B5EF4-FFF2-40B4-BE49-F238E27FC236}">
+                <a16:creationId xmlns:a16="http://schemas.microsoft.com/office/drawing/2014/main" id="{8EC089F5-859D-4D1C-98F1-B752C3F90C02}"/>
+              </a:ext>
+            </a:extLst>
+          </p:cNvPr>
+          <p:cNvSpPr>
+            <a:spLocks noGrp="1"/>
+          </p:cNvSpPr>
+          <p:nvPr>
+            <p:ph type="sldNum" sz="quarter" idx="12"/>
+          </p:nvPr>
+        </p:nvSpPr>
+        <p:spPr/>
+        <p:txBody>
+          <a:bodyPr/>
+          <a:lstStyle/>
+          <a:p>
+            <a:fld id="{46DDA321-FAA7-430B-9842-4C62AA7BAF3F}" type="slidenum">
+              <a:rPr lang="en-AU" smtClean="0"/>
+              <a:t>15</a:t>
+            </a:fld>
+            <a:endParaRPr lang="en-AU"/>
+          </a:p>
+        </p:txBody>
+      </p:sp>
     </p:spTree>
     <p:extLst>
       <p:ext uri="{BB962C8B-B14F-4D97-AF65-F5344CB8AC3E}">
@@ -6964,6 +7262,35 @@
           </a:prstGeom>
         </p:spPr>
       </p:pic>
+      <p:sp>
+        <p:nvSpPr>
+          <p:cNvPr id="3" name="Slide Number Placeholder 2">
+            <a:extLst>
+              <a:ext uri="{FF2B5EF4-FFF2-40B4-BE49-F238E27FC236}">
+                <a16:creationId xmlns:a16="http://schemas.microsoft.com/office/drawing/2014/main" id="{DDA73B0A-F55B-47F2-B929-8FB0C9E8A041}"/>
+              </a:ext>
+            </a:extLst>
+          </p:cNvPr>
+          <p:cNvSpPr>
+            <a:spLocks noGrp="1"/>
+          </p:cNvSpPr>
+          <p:nvPr>
+            <p:ph type="sldNum" sz="quarter" idx="12"/>
+          </p:nvPr>
+        </p:nvSpPr>
+        <p:spPr/>
+        <p:txBody>
+          <a:bodyPr/>
+          <a:lstStyle/>
+          <a:p>
+            <a:fld id="{46DDA321-FAA7-430B-9842-4C62AA7BAF3F}" type="slidenum">
+              <a:rPr lang="en-AU" smtClean="0"/>
+              <a:t>16</a:t>
+            </a:fld>
+            <a:endParaRPr lang="en-AU"/>
+          </a:p>
+        </p:txBody>
+      </p:sp>
     </p:spTree>
     <p:extLst>
       <p:ext uri="{BB962C8B-B14F-4D97-AF65-F5344CB8AC3E}">
@@ -7686,6 +8013,35 @@
           </a:p>
         </p:txBody>
       </p:sp>
+      <p:sp>
+        <p:nvSpPr>
+          <p:cNvPr id="3" name="Slide Number Placeholder 2">
+            <a:extLst>
+              <a:ext uri="{FF2B5EF4-FFF2-40B4-BE49-F238E27FC236}">
+                <a16:creationId xmlns:a16="http://schemas.microsoft.com/office/drawing/2014/main" id="{C284D4B0-5A31-414B-A2FB-AED9D4FEFF61}"/>
+              </a:ext>
+            </a:extLst>
+          </p:cNvPr>
+          <p:cNvSpPr>
+            <a:spLocks noGrp="1"/>
+          </p:cNvSpPr>
+          <p:nvPr>
+            <p:ph type="sldNum" sz="quarter" idx="12"/>
+          </p:nvPr>
+        </p:nvSpPr>
+        <p:spPr/>
+        <p:txBody>
+          <a:bodyPr/>
+          <a:lstStyle/>
+          <a:p>
+            <a:fld id="{46DDA321-FAA7-430B-9842-4C62AA7BAF3F}" type="slidenum">
+              <a:rPr lang="en-AU" smtClean="0"/>
+              <a:t>17</a:t>
+            </a:fld>
+            <a:endParaRPr lang="en-AU"/>
+          </a:p>
+        </p:txBody>
+      </p:sp>
     </p:spTree>
     <p:extLst>
       <p:ext uri="{BB962C8B-B14F-4D97-AF65-F5344CB8AC3E}">
@@ -7752,6 +8108,35 @@
           </a:p>
         </p:txBody>
       </p:sp>
+      <p:sp>
+        <p:nvSpPr>
+          <p:cNvPr id="2" name="Slide Number Placeholder 1">
+            <a:extLst>
+              <a:ext uri="{FF2B5EF4-FFF2-40B4-BE49-F238E27FC236}">
+                <a16:creationId xmlns:a16="http://schemas.microsoft.com/office/drawing/2014/main" id="{B6F87ACC-3346-4674-B6FD-4FF5F3BA702D}"/>
+              </a:ext>
+            </a:extLst>
+          </p:cNvPr>
+          <p:cNvSpPr>
+            <a:spLocks noGrp="1"/>
+          </p:cNvSpPr>
+          <p:nvPr>
+            <p:ph type="sldNum" sz="quarter" idx="12"/>
+          </p:nvPr>
+        </p:nvSpPr>
+        <p:spPr/>
+        <p:txBody>
+          <a:bodyPr/>
+          <a:lstStyle/>
+          <a:p>
+            <a:fld id="{46DDA321-FAA7-430B-9842-4C62AA7BAF3F}" type="slidenum">
+              <a:rPr lang="en-AU" smtClean="0"/>
+              <a:t>18</a:t>
+            </a:fld>
+            <a:endParaRPr lang="en-AU"/>
+          </a:p>
+        </p:txBody>
+      </p:sp>
     </p:spTree>
     <p:extLst>
       <p:ext uri="{BB962C8B-B14F-4D97-AF65-F5344CB8AC3E}">
@@ -7939,6 +8324,35 @@
           </a:p>
         </p:txBody>
       </p:sp>
+      <p:sp>
+        <p:nvSpPr>
+          <p:cNvPr id="4" name="Slide Number Placeholder 3">
+            <a:extLst>
+              <a:ext uri="{FF2B5EF4-FFF2-40B4-BE49-F238E27FC236}">
+                <a16:creationId xmlns:a16="http://schemas.microsoft.com/office/drawing/2014/main" id="{D6F35903-4906-4F0C-B075-2F279237F3CB}"/>
+              </a:ext>
+            </a:extLst>
+          </p:cNvPr>
+          <p:cNvSpPr>
+            <a:spLocks noGrp="1"/>
+          </p:cNvSpPr>
+          <p:nvPr>
+            <p:ph type="sldNum" sz="quarter" idx="12"/>
+          </p:nvPr>
+        </p:nvSpPr>
+        <p:spPr/>
+        <p:txBody>
+          <a:bodyPr/>
+          <a:lstStyle/>
+          <a:p>
+            <a:fld id="{46DDA321-FAA7-430B-9842-4C62AA7BAF3F}" type="slidenum">
+              <a:rPr lang="en-AU" smtClean="0"/>
+              <a:t>2</a:t>
+            </a:fld>
+            <a:endParaRPr lang="en-AU"/>
+          </a:p>
+        </p:txBody>
+      </p:sp>
     </p:spTree>
     <p:extLst>
       <p:ext uri="{BB962C8B-B14F-4D97-AF65-F5344CB8AC3E}">
@@ -8264,6 +8678,35 @@
           </a:p>
         </p:txBody>
       </p:sp>
+      <p:sp>
+        <p:nvSpPr>
+          <p:cNvPr id="3" name="Slide Number Placeholder 2">
+            <a:extLst>
+              <a:ext uri="{FF2B5EF4-FFF2-40B4-BE49-F238E27FC236}">
+                <a16:creationId xmlns:a16="http://schemas.microsoft.com/office/drawing/2014/main" id="{455B3736-567D-4513-8584-BEB6DF8A4896}"/>
+              </a:ext>
+            </a:extLst>
+          </p:cNvPr>
+          <p:cNvSpPr>
+            <a:spLocks noGrp="1"/>
+          </p:cNvSpPr>
+          <p:nvPr>
+            <p:ph type="sldNum" sz="quarter" idx="12"/>
+          </p:nvPr>
+        </p:nvSpPr>
+        <p:spPr/>
+        <p:txBody>
+          <a:bodyPr/>
+          <a:lstStyle/>
+          <a:p>
+            <a:fld id="{46DDA321-FAA7-430B-9842-4C62AA7BAF3F}" type="slidenum">
+              <a:rPr lang="en-AU" smtClean="0"/>
+              <a:t>3</a:t>
+            </a:fld>
+            <a:endParaRPr lang="en-AU"/>
+          </a:p>
+        </p:txBody>
+      </p:sp>
     </p:spTree>
     <p:extLst>
       <p:ext uri="{BB962C8B-B14F-4D97-AF65-F5344CB8AC3E}">
@@ -8442,6 +8885,35 @@
           </a:prstGeom>
         </p:spPr>
       </p:pic>
+      <p:sp>
+        <p:nvSpPr>
+          <p:cNvPr id="3" name="Slide Number Placeholder 2">
+            <a:extLst>
+              <a:ext uri="{FF2B5EF4-FFF2-40B4-BE49-F238E27FC236}">
+                <a16:creationId xmlns:a16="http://schemas.microsoft.com/office/drawing/2014/main" id="{A03E7A4E-A46E-4451-B36C-DDFDFEC4D4FD}"/>
+              </a:ext>
+            </a:extLst>
+          </p:cNvPr>
+          <p:cNvSpPr>
+            <a:spLocks noGrp="1"/>
+          </p:cNvSpPr>
+          <p:nvPr>
+            <p:ph type="sldNum" sz="quarter" idx="12"/>
+          </p:nvPr>
+        </p:nvSpPr>
+        <p:spPr/>
+        <p:txBody>
+          <a:bodyPr/>
+          <a:lstStyle/>
+          <a:p>
+            <a:fld id="{46DDA321-FAA7-430B-9842-4C62AA7BAF3F}" type="slidenum">
+              <a:rPr lang="en-AU" smtClean="0"/>
+              <a:t>4</a:t>
+            </a:fld>
+            <a:endParaRPr lang="en-AU"/>
+          </a:p>
+        </p:txBody>
+      </p:sp>
     </p:spTree>
     <p:extLst>
       <p:ext uri="{BB962C8B-B14F-4D97-AF65-F5344CB8AC3E}">
@@ -8576,6 +9048,35 @@
           </a:p>
         </p:txBody>
       </p:sp>
+      <p:sp>
+        <p:nvSpPr>
+          <p:cNvPr id="4" name="Slide Number Placeholder 3">
+            <a:extLst>
+              <a:ext uri="{FF2B5EF4-FFF2-40B4-BE49-F238E27FC236}">
+                <a16:creationId xmlns:a16="http://schemas.microsoft.com/office/drawing/2014/main" id="{DCBC6EB3-A8A4-4DF2-902F-DDD809C32C9C}"/>
+              </a:ext>
+            </a:extLst>
+          </p:cNvPr>
+          <p:cNvSpPr>
+            <a:spLocks noGrp="1"/>
+          </p:cNvSpPr>
+          <p:nvPr>
+            <p:ph type="sldNum" sz="quarter" idx="12"/>
+          </p:nvPr>
+        </p:nvSpPr>
+        <p:spPr/>
+        <p:txBody>
+          <a:bodyPr/>
+          <a:lstStyle/>
+          <a:p>
+            <a:fld id="{46DDA321-FAA7-430B-9842-4C62AA7BAF3F}" type="slidenum">
+              <a:rPr lang="en-AU" smtClean="0"/>
+              <a:t>5</a:t>
+            </a:fld>
+            <a:endParaRPr lang="en-AU"/>
+          </a:p>
+        </p:txBody>
+      </p:sp>
     </p:spTree>
     <p:extLst>
       <p:ext uri="{BB962C8B-B14F-4D97-AF65-F5344CB8AC3E}">
@@ -8737,6 +9238,35 @@
               <a:latin typeface="Roboto Light" panose="02000000000000000000" pitchFamily="2" charset="0"/>
               <a:ea typeface="Roboto Light" panose="02000000000000000000" pitchFamily="2" charset="0"/>
             </a:endParaRPr>
+          </a:p>
+        </p:txBody>
+      </p:sp>
+      <p:sp>
+        <p:nvSpPr>
+          <p:cNvPr id="4" name="Slide Number Placeholder 3">
+            <a:extLst>
+              <a:ext uri="{FF2B5EF4-FFF2-40B4-BE49-F238E27FC236}">
+                <a16:creationId xmlns:a16="http://schemas.microsoft.com/office/drawing/2014/main" id="{325772C8-7112-47F1-8DBB-156F1AFA642B}"/>
+              </a:ext>
+            </a:extLst>
+          </p:cNvPr>
+          <p:cNvSpPr>
+            <a:spLocks noGrp="1"/>
+          </p:cNvSpPr>
+          <p:nvPr>
+            <p:ph type="sldNum" sz="quarter" idx="12"/>
+          </p:nvPr>
+        </p:nvSpPr>
+        <p:spPr/>
+        <p:txBody>
+          <a:bodyPr/>
+          <a:lstStyle/>
+          <a:p>
+            <a:fld id="{46DDA321-FAA7-430B-9842-4C62AA7BAF3F}" type="slidenum">
+              <a:rPr lang="en-AU" smtClean="0"/>
+              <a:t>6</a:t>
+            </a:fld>
+            <a:endParaRPr lang="en-AU"/>
           </a:p>
         </p:txBody>
       </p:sp>
@@ -9246,6 +9776,35 @@
           </a:p>
         </p:txBody>
       </p:sp>
+      <p:sp>
+        <p:nvSpPr>
+          <p:cNvPr id="5" name="Slide Number Placeholder 4">
+            <a:extLst>
+              <a:ext uri="{FF2B5EF4-FFF2-40B4-BE49-F238E27FC236}">
+                <a16:creationId xmlns:a16="http://schemas.microsoft.com/office/drawing/2014/main" id="{927CFE9B-561C-431D-A88C-0FE655540B9F}"/>
+              </a:ext>
+            </a:extLst>
+          </p:cNvPr>
+          <p:cNvSpPr>
+            <a:spLocks noGrp="1"/>
+          </p:cNvSpPr>
+          <p:nvPr>
+            <p:ph type="sldNum" sz="quarter" idx="12"/>
+          </p:nvPr>
+        </p:nvSpPr>
+        <p:spPr/>
+        <p:txBody>
+          <a:bodyPr/>
+          <a:lstStyle/>
+          <a:p>
+            <a:fld id="{46DDA321-FAA7-430B-9842-4C62AA7BAF3F}" type="slidenum">
+              <a:rPr lang="en-AU" smtClean="0"/>
+              <a:t>7</a:t>
+            </a:fld>
+            <a:endParaRPr lang="en-AU"/>
+          </a:p>
+        </p:txBody>
+      </p:sp>
     </p:spTree>
     <p:extLst>
       <p:ext uri="{BB962C8B-B14F-4D97-AF65-F5344CB8AC3E}">
@@ -9884,6 +10443,35 @@
           </a:p>
         </p:txBody>
       </p:sp>
+      <p:sp>
+        <p:nvSpPr>
+          <p:cNvPr id="3" name="Slide Number Placeholder 2">
+            <a:extLst>
+              <a:ext uri="{FF2B5EF4-FFF2-40B4-BE49-F238E27FC236}">
+                <a16:creationId xmlns:a16="http://schemas.microsoft.com/office/drawing/2014/main" id="{178F9897-6211-4962-9A36-27CFC2C12A8A}"/>
+              </a:ext>
+            </a:extLst>
+          </p:cNvPr>
+          <p:cNvSpPr>
+            <a:spLocks noGrp="1"/>
+          </p:cNvSpPr>
+          <p:nvPr>
+            <p:ph type="sldNum" sz="quarter" idx="12"/>
+          </p:nvPr>
+        </p:nvSpPr>
+        <p:spPr/>
+        <p:txBody>
+          <a:bodyPr/>
+          <a:lstStyle/>
+          <a:p>
+            <a:fld id="{46DDA321-FAA7-430B-9842-4C62AA7BAF3F}" type="slidenum">
+              <a:rPr lang="en-AU" smtClean="0"/>
+              <a:t>8</a:t>
+            </a:fld>
+            <a:endParaRPr lang="en-AU"/>
+          </a:p>
+        </p:txBody>
+      </p:sp>
     </p:spTree>
     <p:extLst>
       <p:ext uri="{BB962C8B-B14F-4D97-AF65-F5344CB8AC3E}">
@@ -10027,6 +10615,35 @@
               </a:rPr>
               <a:t>https://towardsdatascience.com/types-of-machine-learning-algorithms-you-should-know-953a08248861</a:t>
             </a:r>
+          </a:p>
+        </p:txBody>
+      </p:sp>
+      <p:sp>
+        <p:nvSpPr>
+          <p:cNvPr id="3" name="Slide Number Placeholder 2">
+            <a:extLst>
+              <a:ext uri="{FF2B5EF4-FFF2-40B4-BE49-F238E27FC236}">
+                <a16:creationId xmlns:a16="http://schemas.microsoft.com/office/drawing/2014/main" id="{AC8A4ADD-363B-4355-AF64-47DE5152DF36}"/>
+              </a:ext>
+            </a:extLst>
+          </p:cNvPr>
+          <p:cNvSpPr>
+            <a:spLocks noGrp="1"/>
+          </p:cNvSpPr>
+          <p:nvPr>
+            <p:ph type="sldNum" sz="quarter" idx="12"/>
+          </p:nvPr>
+        </p:nvSpPr>
+        <p:spPr/>
+        <p:txBody>
+          <a:bodyPr/>
+          <a:lstStyle/>
+          <a:p>
+            <a:fld id="{46DDA321-FAA7-430B-9842-4C62AA7BAF3F}" type="slidenum">
+              <a:rPr lang="en-AU" smtClean="0"/>
+              <a:t>9</a:t>
+            </a:fld>
+            <a:endParaRPr lang="en-AU"/>
           </a:p>
         </p:txBody>
       </p:sp>

</xml_diff>

<commit_message>
updated README and binder
</commit_message>
<xml_diff>
--- a/Problem Formulation & EDA.pptx
+++ b/Problem Formulation & EDA.pptx
@@ -137,7 +137,7 @@
   <pc:docChgLst>
     <pc:chgData name="Jonathan Tan" userId="857367a7-879e-4e19-86ac-1880d4642e3c" providerId="ADAL" clId="{4F4A7EE7-ED1A-4BB8-B90A-17AB4A4179EB}"/>
     <pc:docChg chg="undo custSel addSld delSld modSld">
-      <pc:chgData name="Jonathan Tan" userId="857367a7-879e-4e19-86ac-1880d4642e3c" providerId="ADAL" clId="{4F4A7EE7-ED1A-4BB8-B90A-17AB4A4179EB}" dt="2021-08-11T23:24:33.376" v="4589" actId="20577"/>
+      <pc:chgData name="Jonathan Tan" userId="857367a7-879e-4e19-86ac-1880d4642e3c" providerId="ADAL" clId="{4F4A7EE7-ED1A-4BB8-B90A-17AB4A4179EB}" dt="2021-08-12T01:40:20.525" v="4665" actId="14100"/>
       <pc:docMkLst>
         <pc:docMk/>
       </pc:docMkLst>
@@ -328,11 +328,19 @@
         </pc:picChg>
       </pc:sldChg>
       <pc:sldChg chg="addSp modSp mod">
-        <pc:chgData name="Jonathan Tan" userId="857367a7-879e-4e19-86ac-1880d4642e3c" providerId="ADAL" clId="{4F4A7EE7-ED1A-4BB8-B90A-17AB4A4179EB}" dt="2021-08-11T10:58:33.875" v="4561" actId="1076"/>
+        <pc:chgData name="Jonathan Tan" userId="857367a7-879e-4e19-86ac-1880d4642e3c" providerId="ADAL" clId="{4F4A7EE7-ED1A-4BB8-B90A-17AB4A4179EB}" dt="2021-08-12T01:40:20.525" v="4665" actId="14100"/>
         <pc:sldMkLst>
           <pc:docMk/>
           <pc:sldMk cId="2791687609" sldId="264"/>
         </pc:sldMkLst>
+        <pc:spChg chg="mod">
+          <ac:chgData name="Jonathan Tan" userId="857367a7-879e-4e19-86ac-1880d4642e3c" providerId="ADAL" clId="{4F4A7EE7-ED1A-4BB8-B90A-17AB4A4179EB}" dt="2021-08-12T01:40:20.525" v="4665" actId="14100"/>
+          <ac:spMkLst>
+            <pc:docMk/>
+            <pc:sldMk cId="2791687609" sldId="264"/>
+            <ac:spMk id="5" creationId="{00112385-DF1D-42A7-809F-30E8BB4D1D1B}"/>
+          </ac:spMkLst>
+        </pc:spChg>
         <pc:spChg chg="add mod">
           <ac:chgData name="Jonathan Tan" userId="857367a7-879e-4e19-86ac-1880d4642e3c" providerId="ADAL" clId="{4F4A7EE7-ED1A-4BB8-B90A-17AB4A4179EB}" dt="2021-08-11T10:57:19.917" v="4484" actId="20577"/>
           <ac:spMkLst>
@@ -555,7 +563,7 @@
         </pc:picChg>
       </pc:sldChg>
       <pc:sldChg chg="addSp modSp new mod modNotesTx">
-        <pc:chgData name="Jonathan Tan" userId="857367a7-879e-4e19-86ac-1880d4642e3c" providerId="ADAL" clId="{4F4A7EE7-ED1A-4BB8-B90A-17AB4A4179EB}" dt="2021-08-11T04:17:57.832" v="2246" actId="20577"/>
+        <pc:chgData name="Jonathan Tan" userId="857367a7-879e-4e19-86ac-1880d4642e3c" providerId="ADAL" clId="{4F4A7EE7-ED1A-4BB8-B90A-17AB4A4179EB}" dt="2021-08-12T00:50:37.694" v="4634" actId="20577"/>
         <pc:sldMkLst>
           <pc:docMk/>
           <pc:sldMk cId="258725277" sldId="273"/>
@@ -577,7 +585,7 @@
           </ac:spMkLst>
         </pc:spChg>
         <pc:spChg chg="add mod">
-          <ac:chgData name="Jonathan Tan" userId="857367a7-879e-4e19-86ac-1880d4642e3c" providerId="ADAL" clId="{4F4A7EE7-ED1A-4BB8-B90A-17AB4A4179EB}" dt="2021-08-11T04:16:03.360" v="1954" actId="2711"/>
+          <ac:chgData name="Jonathan Tan" userId="857367a7-879e-4e19-86ac-1880d4642e3c" providerId="ADAL" clId="{4F4A7EE7-ED1A-4BB8-B90A-17AB4A4179EB}" dt="2021-08-12T00:50:37.694" v="4634" actId="20577"/>
           <ac:spMkLst>
             <pc:docMk/>
             <pc:sldMk cId="258725277" sldId="273"/>
@@ -679,7 +687,7 @@
         </pc:spChg>
       </pc:sldChg>
       <pc:sldChg chg="modSp new mod">
-        <pc:chgData name="Jonathan Tan" userId="857367a7-879e-4e19-86ac-1880d4642e3c" providerId="ADAL" clId="{4F4A7EE7-ED1A-4BB8-B90A-17AB4A4179EB}" dt="2021-08-11T09:20:10.493" v="4442" actId="20577"/>
+        <pc:chgData name="Jonathan Tan" userId="857367a7-879e-4e19-86ac-1880d4642e3c" providerId="ADAL" clId="{4F4A7EE7-ED1A-4BB8-B90A-17AB4A4179EB}" dt="2021-08-12T01:09:40.066" v="4664" actId="20577"/>
         <pc:sldMkLst>
           <pc:docMk/>
           <pc:sldMk cId="2881466440" sldId="277"/>
@@ -693,7 +701,7 @@
           </ac:spMkLst>
         </pc:spChg>
         <pc:spChg chg="mod">
-          <ac:chgData name="Jonathan Tan" userId="857367a7-879e-4e19-86ac-1880d4642e3c" providerId="ADAL" clId="{4F4A7EE7-ED1A-4BB8-B90A-17AB4A4179EB}" dt="2021-08-11T09:20:10.493" v="4442" actId="20577"/>
+          <ac:chgData name="Jonathan Tan" userId="857367a7-879e-4e19-86ac-1880d4642e3c" providerId="ADAL" clId="{4F4A7EE7-ED1A-4BB8-B90A-17AB4A4179EB}" dt="2021-08-12T01:09:40.066" v="4664" actId="20577"/>
           <ac:spMkLst>
             <pc:docMk/>
             <pc:sldMk cId="2881466440" sldId="277"/>
@@ -6638,7 +6646,7 @@
         <p:spPr/>
         <p:txBody>
           <a:bodyPr>
-            <a:normAutofit lnSpcReduction="10000"/>
+            <a:normAutofit fontScale="92500" lnSpcReduction="10000"/>
           </a:bodyPr>
           <a:lstStyle/>
           <a:p>
@@ -6688,6 +6696,16 @@
                 <a:ea typeface="Roboto Light" panose="02000000000000000000" pitchFamily="2" charset="0"/>
               </a:rPr>
               <a:t>Scatter matrix</a:t>
+            </a:r>
+          </a:p>
+          <a:p>
+            <a:pPr lvl="2"/>
+            <a:r>
+              <a:rPr lang="en-AU" sz="1900" dirty="0">
+                <a:latin typeface="Roboto Light" panose="02000000000000000000" pitchFamily="2" charset="0"/>
+                <a:ea typeface="Roboto Light" panose="02000000000000000000" pitchFamily="2" charset="0"/>
+              </a:rPr>
+              <a:t>interact</a:t>
             </a:r>
           </a:p>
           <a:p>
@@ -7367,7 +7385,7 @@
         <p:spPr>
           <a:xfrm>
             <a:off x="838200" y="3237940"/>
-            <a:ext cx="11049000" cy="369332"/>
+            <a:ext cx="11264900" cy="369332"/>
           </a:xfrm>
           <a:prstGeom prst="rect">
             <a:avLst/>
@@ -9438,7 +9456,7 @@
         </p:spPr>
         <p:txBody>
           <a:bodyPr vert="horz" lIns="91440" tIns="45720" rIns="91440" bIns="45720" rtlCol="0">
-            <a:normAutofit fontScale="70000" lnSpcReduction="20000"/>
+            <a:normAutofit fontScale="62500" lnSpcReduction="20000"/>
           </a:bodyPr>
           <a:lstStyle>
             <a:lvl1pPr marL="228600" indent="-228600" algn="l" defTabSz="914400" rtl="0" eaLnBrk="1" latinLnBrk="0" hangingPunct="1">
@@ -9677,7 +9695,7 @@
                 <a:latin typeface="Roboto Light" panose="02000000000000000000" pitchFamily="2" charset="0"/>
                 <a:ea typeface="Roboto Light" panose="02000000000000000000" pitchFamily="2" charset="0"/>
               </a:rPr>
-              <a:t>make informed decisions on price adjustments</a:t>
+              <a:t>make informed decisions on price adjustments based on risk profile</a:t>
             </a:r>
           </a:p>
           <a:p>
@@ -9705,7 +9723,7 @@
                 <a:latin typeface="Roboto Light" panose="02000000000000000000" pitchFamily="2" charset="0"/>
                 <a:ea typeface="Roboto Light" panose="02000000000000000000" pitchFamily="2" charset="0"/>
               </a:rPr>
-              <a:t>The sales performance</a:t>
+              <a:t>The sales performance and profitability</a:t>
             </a:r>
           </a:p>
           <a:p>

</xml_diff>